<commit_message>
updates to announcements and fix issue on 1 slide
</commit_message>
<xml_diff>
--- a/slides/On-Campus/10_03_IntrotoRecursion.pptx
+++ b/slides/On-Campus/10_03_IntrotoRecursion.pptx
@@ -8093,6 +8093,21 @@
             <a:endParaRPr lang="en-US" dirty="0"/>
           </a:p>
           <a:p>
+            <a:endParaRPr lang="en-US" dirty="0"/>
+          </a:p>
+          <a:p>
+            <a:r>
+              <a:rPr lang="en-US" dirty="0"/>
+              <a:t>SUNDAY help desk – closed (Halloween!)</a:t>
+            </a:r>
+          </a:p>
+          <a:p>
+            <a:endParaRPr lang="en-US" dirty="0"/>
+          </a:p>
+          <a:p>
+            <a:endParaRPr lang="en-US" dirty="0"/>
+          </a:p>
+          <a:p>
             <a:r>
               <a:rPr lang="en-US" dirty="0"/>
               <a:t>Help Session with Andrew</a:t>
@@ -8213,7 +8228,7 @@
           <a:p>
             <a:r>
               <a:rPr lang="en-US" dirty="0"/>
-              <a:t>Can we say that a 2D array is an array of arrays? Explain your thoughts to your classmate sited by your side. </a:t>
+              <a:t>Talk about the different loops, how comfortable are you with nested loops, what about nested three times? What about accessing 2D+ arrays with them?</a:t>
             </a:r>
           </a:p>
         </p:txBody>
@@ -8303,25 +8318,12 @@
         <p:spPr>
           <a:xfrm>
             <a:off x="628076" y="1544303"/>
-            <a:ext cx="4762631" cy="1716432"/>
+            <a:ext cx="4762631" cy="857735"/>
           </a:xfrm>
         </p:spPr>
         <p:txBody>
           <a:bodyPr/>
           <a:lstStyle/>
-          <a:p>
-            <a:r>
-              <a:rPr lang="en-US" dirty="0"/>
-              <a:t>Hint: You have already been doing it!</a:t>
-            </a:r>
-          </a:p>
-          <a:p>
-            <a:pPr lvl="1"/>
-            <a:r>
-              <a:rPr lang="en-US" dirty="0"/>
-              <a:t>menu’s in practical projects</a:t>
-            </a:r>
-          </a:p>
           <a:p>
             <a:r>
               <a:rPr lang="en-US" dirty="0"/>
@@ -8361,7 +8363,7 @@
         </p:nvSpPr>
         <p:spPr>
           <a:xfrm>
-            <a:off x="642316" y="3347962"/>
+            <a:off x="628073" y="2482619"/>
             <a:ext cx="4858325" cy="1230080"/>
           </a:xfrm>
           <a:prstGeom prst="rect">
@@ -9044,7 +9046,7 @@
         </p:nvSpPr>
         <p:spPr>
           <a:xfrm>
-            <a:off x="628074" y="4681318"/>
+            <a:off x="628072" y="4273994"/>
             <a:ext cx="4858325" cy="1153201"/>
           </a:xfrm>
           <a:prstGeom prst="rect">
@@ -9248,7 +9250,7 @@
         </p:nvSpPr>
         <p:spPr>
           <a:xfrm>
-            <a:off x="1400168" y="5739227"/>
+            <a:off x="1400168" y="5584655"/>
             <a:ext cx="3659271" cy="1569660"/>
           </a:xfrm>
           <a:prstGeom prst="rect">
@@ -11286,26 +11288,26 @@
           <a:custGeom>
             <a:avLst/>
             <a:gdLst>
-              <a:gd name="connsiteX0" fmla="*/ 0 w 819735"/>
-              <a:gd name="connsiteY0" fmla="*/ 250291 h 500581"/>
-              <a:gd name="connsiteX1" fmla="*/ 409868 w 819735"/>
-              <a:gd name="connsiteY1" fmla="*/ 0 h 500581"/>
-              <a:gd name="connsiteX2" fmla="*/ 819736 w 819735"/>
-              <a:gd name="connsiteY2" fmla="*/ 250291 h 500581"/>
-              <a:gd name="connsiteX3" fmla="*/ 409868 w 819735"/>
-              <a:gd name="connsiteY3" fmla="*/ 500582 h 500581"/>
-              <a:gd name="connsiteX4" fmla="*/ 0 w 819735"/>
-              <a:gd name="connsiteY4" fmla="*/ 250291 h 500581"/>
-              <a:gd name="connsiteX5" fmla="*/ 35641 w 819735"/>
-              <a:gd name="connsiteY5" fmla="*/ 250291 h 500581"/>
-              <a:gd name="connsiteX6" fmla="*/ 409867 w 819735"/>
-              <a:gd name="connsiteY6" fmla="*/ 464940 h 500581"/>
-              <a:gd name="connsiteX7" fmla="*/ 784093 w 819735"/>
-              <a:gd name="connsiteY7" fmla="*/ 250291 h 500581"/>
-              <a:gd name="connsiteX8" fmla="*/ 409867 w 819735"/>
-              <a:gd name="connsiteY8" fmla="*/ 35642 h 500581"/>
-              <a:gd name="connsiteX9" fmla="*/ 35641 w 819735"/>
-              <a:gd name="connsiteY9" fmla="*/ 250291 h 500581"/>
+              <a:gd name="connsiteX0" fmla="*/ 0 w 1410424"/>
+              <a:gd name="connsiteY0" fmla="*/ 245216 h 490432"/>
+              <a:gd name="connsiteX1" fmla="*/ 705212 w 1410424"/>
+              <a:gd name="connsiteY1" fmla="*/ 0 h 490432"/>
+              <a:gd name="connsiteX2" fmla="*/ 1410424 w 1410424"/>
+              <a:gd name="connsiteY2" fmla="*/ 245216 h 490432"/>
+              <a:gd name="connsiteX3" fmla="*/ 705212 w 1410424"/>
+              <a:gd name="connsiteY3" fmla="*/ 490432 h 490432"/>
+              <a:gd name="connsiteX4" fmla="*/ 0 w 1410424"/>
+              <a:gd name="connsiteY4" fmla="*/ 245216 h 490432"/>
+              <a:gd name="connsiteX5" fmla="*/ 34919 w 1410424"/>
+              <a:gd name="connsiteY5" fmla="*/ 245216 h 490432"/>
+              <a:gd name="connsiteX6" fmla="*/ 705212 w 1410424"/>
+              <a:gd name="connsiteY6" fmla="*/ 455513 h 490432"/>
+              <a:gd name="connsiteX7" fmla="*/ 1375505 w 1410424"/>
+              <a:gd name="connsiteY7" fmla="*/ 245216 h 490432"/>
+              <a:gd name="connsiteX8" fmla="*/ 705212 w 1410424"/>
+              <a:gd name="connsiteY8" fmla="*/ 34919 h 490432"/>
+              <a:gd name="connsiteX9" fmla="*/ 34919 w 1410424"/>
+              <a:gd name="connsiteY9" fmla="*/ 245216 h 490432"/>
             </a:gdLst>
             <a:ahLst/>
             <a:cxnLst>
@@ -11342,103 +11344,103 @@
             </a:cxnLst>
             <a:rect l="l" t="t" r="r" b="b"/>
             <a:pathLst>
-              <a:path w="819735" h="500581" fill="none" extrusionOk="0">
+              <a:path w="1410424" h="490432" fill="none" extrusionOk="0">
                 <a:moveTo>
-                  <a:pt x="0" y="250291"/>
+                  <a:pt x="0" y="245216"/>
                 </a:moveTo>
                 <a:cubicBezTo>
-                  <a:pt x="-36954" y="106082"/>
-                  <a:pt x="194361" y="8879"/>
-                  <a:pt x="409868" y="0"/>
+                  <a:pt x="-72540" y="98054"/>
+                  <a:pt x="375274" y="48692"/>
+                  <a:pt x="705212" y="0"/>
                 </a:cubicBezTo>
                 <a:cubicBezTo>
-                  <a:pt x="639082" y="4243"/>
-                  <a:pt x="821036" y="125524"/>
-                  <a:pt x="819736" y="250291"/>
+                  <a:pt x="1107445" y="18988"/>
+                  <a:pt x="1411712" y="123125"/>
+                  <a:pt x="1410424" y="245216"/>
                 </a:cubicBezTo>
                 <a:cubicBezTo>
-                  <a:pt x="847808" y="431764"/>
-                  <a:pt x="657273" y="526355"/>
-                  <a:pt x="409868" y="500582"/>
+                  <a:pt x="1436163" y="420291"/>
+                  <a:pt x="1156225" y="565808"/>
+                  <a:pt x="705212" y="490432"/>
                 </a:cubicBezTo>
                 <a:cubicBezTo>
-                  <a:pt x="199466" y="486607"/>
-                  <a:pt x="4850" y="365710"/>
-                  <a:pt x="0" y="250291"/>
+                  <a:pt x="327376" y="480239"/>
+                  <a:pt x="3682" y="363328"/>
+                  <a:pt x="0" y="245216"/>
                 </a:cubicBezTo>
                 <a:close/>
                 <a:moveTo>
-                  <a:pt x="35641" y="250291"/>
+                  <a:pt x="34919" y="245216"/>
                 </a:moveTo>
                 <a:cubicBezTo>
-                  <a:pt x="-20889" y="378121"/>
-                  <a:pt x="190213" y="455987"/>
-                  <a:pt x="409867" y="464940"/>
+                  <a:pt x="20648" y="363704"/>
+                  <a:pt x="311937" y="439587"/>
+                  <a:pt x="705212" y="455513"/>
                 </a:cubicBezTo>
                 <a:cubicBezTo>
-                  <a:pt x="603953" y="464046"/>
-                  <a:pt x="773183" y="346598"/>
-                  <a:pt x="784093" y="250291"/>
+                  <a:pt x="1045865" y="453416"/>
+                  <a:pt x="1363946" y="337798"/>
+                  <a:pt x="1375505" y="245216"/>
                 </a:cubicBezTo>
                 <a:cubicBezTo>
-                  <a:pt x="786835" y="94651"/>
-                  <a:pt x="579475" y="57288"/>
-                  <a:pt x="409867" y="35642"/>
+                  <a:pt x="1378397" y="89952"/>
+                  <a:pt x="1001038" y="78343"/>
+                  <a:pt x="705212" y="34919"/>
                 </a:cubicBezTo>
                 <a:cubicBezTo>
-                  <a:pt x="197930" y="45044"/>
-                  <a:pt x="63224" y="152240"/>
-                  <a:pt x="35641" y="250291"/>
+                  <a:pt x="325766" y="51463"/>
+                  <a:pt x="59047" y="147001"/>
+                  <a:pt x="34919" y="245216"/>
                 </a:cubicBezTo>
                 <a:close/>
               </a:path>
-              <a:path w="819735" h="500581" stroke="0" extrusionOk="0">
+              <a:path w="1410424" h="490432" stroke="0" extrusionOk="0">
                 <a:moveTo>
-                  <a:pt x="0" y="250291"/>
+                  <a:pt x="0" y="245216"/>
                 </a:moveTo>
                 <a:cubicBezTo>
-                  <a:pt x="-26723" y="95576"/>
-                  <a:pt x="178272" y="1964"/>
-                  <a:pt x="409868" y="0"/>
+                  <a:pt x="-63767" y="70454"/>
+                  <a:pt x="242111" y="27632"/>
+                  <a:pt x="705212" y="0"/>
                 </a:cubicBezTo>
                 <a:cubicBezTo>
-                  <a:pt x="673967" y="7944"/>
-                  <a:pt x="798941" y="112720"/>
-                  <a:pt x="819736" y="250291"/>
+                  <a:pt x="1099589" y="1031"/>
+                  <a:pt x="1401782" y="110062"/>
+                  <a:pt x="1410424" y="245216"/>
                 </a:cubicBezTo>
                 <a:cubicBezTo>
-                  <a:pt x="807020" y="400941"/>
-                  <a:pt x="632106" y="523386"/>
-                  <a:pt x="409868" y="500582"/>
+                  <a:pt x="1404588" y="386344"/>
+                  <a:pt x="1084659" y="545878"/>
+                  <a:pt x="705212" y="490432"/>
                 </a:cubicBezTo>
                 <a:cubicBezTo>
-                  <a:pt x="179262" y="498261"/>
-                  <a:pt x="14155" y="395286"/>
-                  <a:pt x="0" y="250291"/>
+                  <a:pt x="297157" y="480268"/>
+                  <a:pt x="28163" y="394101"/>
+                  <a:pt x="0" y="245216"/>
                 </a:cubicBezTo>
                 <a:close/>
                 <a:moveTo>
-                  <a:pt x="35641" y="250291"/>
+                  <a:pt x="34919" y="245216"/>
                 </a:moveTo>
                 <a:cubicBezTo>
-                  <a:pt x="41284" y="369507"/>
-                  <a:pt x="221514" y="427226"/>
-                  <a:pt x="409867" y="464940"/>
+                  <a:pt x="120865" y="371556"/>
+                  <a:pt x="342970" y="439151"/>
+                  <a:pt x="705212" y="455513"/>
                 </a:cubicBezTo>
                 <a:cubicBezTo>
-                  <a:pt x="604408" y="463081"/>
-                  <a:pt x="762568" y="389103"/>
-                  <a:pt x="784093" y="250291"/>
+                  <a:pt x="1041608" y="450337"/>
+                  <a:pt x="1352905" y="382638"/>
+                  <a:pt x="1375505" y="245216"/>
                 </a:cubicBezTo>
                 <a:cubicBezTo>
-                  <a:pt x="781879" y="110630"/>
-                  <a:pt x="603059" y="54385"/>
-                  <a:pt x="409867" y="35642"/>
+                  <a:pt x="1370100" y="77530"/>
+                  <a:pt x="1025099" y="104831"/>
+                  <a:pt x="705212" y="34919"/>
                 </a:cubicBezTo>
                 <a:cubicBezTo>
-                  <a:pt x="206928" y="37736"/>
-                  <a:pt x="43116" y="133541"/>
-                  <a:pt x="35641" y="250291"/>
+                  <a:pt x="338617" y="36934"/>
+                  <a:pt x="40918" y="130514"/>
+                  <a:pt x="34919" y="245216"/>
                 </a:cubicBezTo>
                 <a:close/>
               </a:path>
@@ -11453,7 +11455,7 @@
             </a:solidFill>
             <a:extLst>
               <a:ext uri="{C807C97D-BFC1-408E-A445-0C87EB9F89A2}">
-                <ask:lineSketchStyleProps xmlns:ask="http://schemas.microsoft.com/office/drawing/2018/sketchyshapes" xmlns="" sd="1219033472">
+                <ask:lineSketchStyleProps xmlns:ask="http://schemas.microsoft.com/office/drawing/2018/sketchyshapes" sd="1219033472">
                   <a:prstGeom prst="donut">
                     <a:avLst>
                       <a:gd name="adj" fmla="val 7120"/>
@@ -15991,7 +15993,7 @@
             </a:solidFill>
             <a:extLst>
               <a:ext uri="{C807C97D-BFC1-408E-A445-0C87EB9F89A2}">
-                <ask:lineSketchStyleProps xmlns:ask="http://schemas.microsoft.com/office/drawing/2018/sketchyshapes" xmlns="" sd="1219033472">
+                <ask:lineSketchStyleProps xmlns:ask="http://schemas.microsoft.com/office/drawing/2018/sketchyshapes" sd="1219033472">
                   <a:prstGeom prst="donut">
                     <a:avLst>
                       <a:gd name="adj" fmla="val 7120"/>

</xml_diff>

<commit_message>
sneak peak added for recursion
</commit_message>
<xml_diff>
--- a/slides/On-Campus/10_03_IntrotoRecursion.pptx
+++ b/slides/On-Campus/10_03_IntrotoRecursion.pptx
@@ -5,10 +5,10 @@
     <p:sldMasterId id="2147483648" r:id="rId1"/>
   </p:sldMasterIdLst>
   <p:notesMasterIdLst>
-    <p:notesMasterId r:id="rId9"/>
+    <p:notesMasterId r:id="rId11"/>
   </p:notesMasterIdLst>
   <p:handoutMasterIdLst>
-    <p:handoutMasterId r:id="rId10"/>
+    <p:handoutMasterId r:id="rId12"/>
   </p:handoutMasterIdLst>
   <p:sldIdLst>
     <p:sldId id="256" r:id="rId2"/>
@@ -18,6 +18,8 @@
     <p:sldId id="257" r:id="rId6"/>
     <p:sldId id="258" r:id="rId7"/>
     <p:sldId id="268" r:id="rId8"/>
+    <p:sldId id="269" r:id="rId9"/>
+    <p:sldId id="270" r:id="rId10"/>
   </p:sldIdLst>
   <p:sldSz cx="13817600" cy="7772400"/>
   <p:notesSz cx="6858000" cy="9144000"/>
@@ -916,7 +918,7 @@
           <a:p>
             <a:fld id="{4D7E51A5-B478-1E40-8CBB-0DAA8831E99D}" type="datetimeFigureOut">
               <a:rPr lang="en-US" smtClean="0"/>
-              <a:t>10/28/2021</a:t>
+              <a:t>10/29/2021</a:t>
             </a:fld>
             <a:endParaRPr lang="en-US"/>
           </a:p>
@@ -1081,7 +1083,7 @@
           <a:p>
             <a:fld id="{D0ED587F-861E-6740-9643-E3DDAE89B8D6}" type="datetimeFigureOut">
               <a:rPr lang="en-US" smtClean="0"/>
-              <a:t>10/28/2021</a:t>
+              <a:t>10/29/2021</a:t>
             </a:fld>
             <a:endParaRPr lang="en-US"/>
           </a:p>
@@ -17248,7 +17250,7 @@
         <p:spPr>
           <a:xfrm>
             <a:off x="628075" y="4558301"/>
-            <a:ext cx="5632876" cy="1230080"/>
+            <a:ext cx="5632876" cy="2270430"/>
           </a:xfrm>
           <a:prstGeom prst="rect">
             <a:avLst/>
@@ -17443,6 +17445,23 @@
             <a:r>
               <a:rPr lang="en-US" dirty="0"/>
               <a:t>Write method that calls itself</a:t>
+            </a:r>
+          </a:p>
+          <a:p>
+            <a:pPr lvl="1">
+              <a:buFont typeface="+mj-lt"/>
+              <a:buAutoNum type="arabicPeriod"/>
+            </a:pPr>
+            <a:endParaRPr lang="en-US" dirty="0"/>
+          </a:p>
+          <a:p>
+            <a:pPr lvl="1">
+              <a:buFont typeface="+mj-lt"/>
+              <a:buAutoNum type="arabicPeriod"/>
+            </a:pPr>
+            <a:r>
+              <a:rPr lang="en-US" dirty="0"/>
+              <a:t>Tip – you can change the number of parameters</a:t>
             </a:r>
           </a:p>
         </p:txBody>
@@ -17798,6 +17817,3295 @@
     <p:extLst>
       <p:ext uri="{BB962C8B-B14F-4D97-AF65-F5344CB8AC3E}">
         <p14:creationId xmlns:p14="http://schemas.microsoft.com/office/powerpoint/2010/main" val="3962554218"/>
+      </p:ext>
+    </p:extLst>
+  </p:cSld>
+  <p:clrMapOvr>
+    <a:masterClrMapping/>
+  </p:clrMapOvr>
+  <mc:AlternateContent xmlns:mc="http://schemas.openxmlformats.org/markup-compatibility/2006" xmlns:p14="http://schemas.microsoft.com/office/powerpoint/2010/main">
+    <mc:Choice Requires="p14">
+      <p:transition p14:dur="300">
+        <p:fade/>
+      </p:transition>
+    </mc:Choice>
+    <mc:Fallback xmlns="">
+      <p:transition>
+        <p:fade/>
+      </p:transition>
+    </mc:Fallback>
+  </mc:AlternateContent>
+</p:sld>
+</file>
+
+<file path=ppt/slides/slide8.xml><?xml version="1.0" encoding="utf-8"?>
+<p:sld xmlns:a="http://schemas.openxmlformats.org/drawingml/2006/main" xmlns:r="http://schemas.openxmlformats.org/officeDocument/2006/relationships" xmlns:p="http://schemas.openxmlformats.org/presentationml/2006/main">
+  <p:cSld>
+    <p:spTree>
+      <p:nvGrpSpPr>
+        <p:cNvPr id="1" name=""/>
+        <p:cNvGrpSpPr/>
+        <p:nvPr/>
+      </p:nvGrpSpPr>
+      <p:grpSpPr>
+        <a:xfrm>
+          <a:off x="0" y="0"/>
+          <a:ext cx="0" cy="0"/>
+          <a:chOff x="0" y="0"/>
+          <a:chExt cx="0" cy="0"/>
+        </a:xfrm>
+      </p:grpSpPr>
+      <p:sp>
+        <p:nvSpPr>
+          <p:cNvPr id="2" name="Title 1">
+            <a:extLst>
+              <a:ext uri="{FF2B5EF4-FFF2-40B4-BE49-F238E27FC236}">
+                <a16:creationId xmlns:a16="http://schemas.microsoft.com/office/drawing/2014/main" id="{62E602CE-506F-4418-9599-89351243704D}"/>
+              </a:ext>
+            </a:extLst>
+          </p:cNvPr>
+          <p:cNvSpPr>
+            <a:spLocks noGrp="1"/>
+          </p:cNvSpPr>
+          <p:nvPr>
+            <p:ph type="title"/>
+          </p:nvPr>
+        </p:nvSpPr>
+        <p:spPr>
+          <a:xfrm>
+            <a:off x="758704" y="378802"/>
+            <a:ext cx="12561453" cy="861774"/>
+          </a:xfrm>
+        </p:spPr>
+        <p:txBody>
+          <a:bodyPr/>
+          <a:lstStyle/>
+          <a:p>
+            <a:r>
+              <a:rPr lang="en-US" sz="4400" dirty="0"/>
+              <a:t>Real Example and Sneak Peak Into Inheritance</a:t>
+            </a:r>
+          </a:p>
+        </p:txBody>
+      </p:sp>
+      <p:sp>
+        <p:nvSpPr>
+          <p:cNvPr id="3" name="Text Placeholder 2">
+            <a:extLst>
+              <a:ext uri="{FF2B5EF4-FFF2-40B4-BE49-F238E27FC236}">
+                <a16:creationId xmlns:a16="http://schemas.microsoft.com/office/drawing/2014/main" id="{7A48776A-2F26-487D-9E01-233B647C79DE}"/>
+              </a:ext>
+            </a:extLst>
+          </p:cNvPr>
+          <p:cNvSpPr>
+            <a:spLocks noGrp="1"/>
+          </p:cNvSpPr>
+          <p:nvPr>
+            <p:ph type="body" sz="quarter" idx="10"/>
+          </p:nvPr>
+        </p:nvSpPr>
+        <p:spPr>
+          <a:xfrm>
+            <a:off x="700647" y="1499491"/>
+            <a:ext cx="7565239" cy="5405839"/>
+          </a:xfrm>
+        </p:spPr>
+        <p:txBody>
+          <a:bodyPr/>
+          <a:lstStyle/>
+          <a:p>
+            <a:r>
+              <a:rPr lang="en-US" dirty="0"/>
+              <a:t>Assume you have the following data structure</a:t>
+            </a:r>
+          </a:p>
+          <a:p>
+            <a:pPr lvl="1"/>
+            <a:r>
+              <a:rPr lang="en-US" dirty="0"/>
+              <a:t>An array of values, but some values can be other arrays!</a:t>
+            </a:r>
+          </a:p>
+          <a:p>
+            <a:r>
+              <a:rPr lang="en-US" dirty="0"/>
+              <a:t>How do you represent all the different values?</a:t>
+            </a:r>
+          </a:p>
+          <a:p>
+            <a:r>
+              <a:rPr lang="en-US" b="1" dirty="0"/>
+              <a:t>Inheritance (and Polymorphism)</a:t>
+            </a:r>
+          </a:p>
+          <a:p>
+            <a:pPr lvl="1"/>
+            <a:r>
+              <a:rPr lang="en-US" dirty="0"/>
+              <a:t>All Objects “inherit” from the class Object</a:t>
+            </a:r>
+          </a:p>
+          <a:p>
+            <a:pPr lvl="2"/>
+            <a:r>
+              <a:rPr lang="en-US" dirty="0"/>
+              <a:t>Gains properties of Object </a:t>
+            </a:r>
+          </a:p>
+          <a:p>
+            <a:pPr lvl="2"/>
+            <a:r>
+              <a:rPr lang="en-US" dirty="0"/>
+              <a:t>Which means you can store all objects as Objects</a:t>
+            </a:r>
+          </a:p>
+          <a:p>
+            <a:pPr lvl="2"/>
+            <a:r>
+              <a:rPr lang="en-US" dirty="0"/>
+              <a:t>But you need to ‘cast’ back to do something useful</a:t>
+            </a:r>
+          </a:p>
+          <a:p>
+            <a:r>
+              <a:rPr lang="en-US" dirty="0"/>
+              <a:t>Now – the Real Example</a:t>
+            </a:r>
+          </a:p>
+          <a:p>
+            <a:pPr lvl="1"/>
+            <a:r>
+              <a:rPr lang="en-US" dirty="0"/>
+              <a:t>How can I sum all the values across the structure to the right?</a:t>
+            </a:r>
+          </a:p>
+          <a:p>
+            <a:pPr lvl="2"/>
+            <a:r>
+              <a:rPr lang="en-US" dirty="0"/>
+              <a:t>Would a loop work?</a:t>
+            </a:r>
+          </a:p>
+          <a:p>
+            <a:pPr lvl="3"/>
+            <a:r>
+              <a:rPr lang="en-US" dirty="0"/>
+              <a:t>Why or why not?</a:t>
+            </a:r>
+          </a:p>
+          <a:p>
+            <a:r>
+              <a:rPr lang="en-US" dirty="0"/>
+              <a:t>Solution  - Recursion! </a:t>
+            </a:r>
+          </a:p>
+        </p:txBody>
+      </p:sp>
+      <p:grpSp>
+        <p:nvGrpSpPr>
+          <p:cNvPr id="23" name="Group 22">
+            <a:extLst>
+              <a:ext uri="{FF2B5EF4-FFF2-40B4-BE49-F238E27FC236}">
+                <a16:creationId xmlns:a16="http://schemas.microsoft.com/office/drawing/2014/main" id="{67B5F29E-87D8-49A9-8A16-755ADDC94F51}"/>
+              </a:ext>
+            </a:extLst>
+          </p:cNvPr>
+          <p:cNvGrpSpPr/>
+          <p:nvPr/>
+        </p:nvGrpSpPr>
+        <p:grpSpPr>
+          <a:xfrm>
+            <a:off x="8955314" y="1872343"/>
+            <a:ext cx="667658" cy="2713060"/>
+            <a:chOff x="8781143" y="1872343"/>
+            <a:chExt cx="667658" cy="2713060"/>
+          </a:xfrm>
+        </p:grpSpPr>
+        <p:sp>
+          <p:nvSpPr>
+            <p:cNvPr id="4" name="Rectangle 3">
+              <a:extLst>
+                <a:ext uri="{FF2B5EF4-FFF2-40B4-BE49-F238E27FC236}">
+                  <a16:creationId xmlns:a16="http://schemas.microsoft.com/office/drawing/2014/main" id="{380519C1-018C-4072-949F-550DC97B1EDB}"/>
+                </a:ext>
+              </a:extLst>
+            </p:cNvPr>
+            <p:cNvSpPr/>
+            <p:nvPr/>
+          </p:nvSpPr>
+          <p:spPr>
+            <a:xfrm>
+              <a:off x="8781143" y="1872343"/>
+              <a:ext cx="667658" cy="464457"/>
+            </a:xfrm>
+            <a:prstGeom prst="rect">
+              <a:avLst/>
+            </a:prstGeom>
+            <a:solidFill>
+              <a:schemeClr val="bg1"/>
+            </a:solidFill>
+            <a:ln>
+              <a:solidFill>
+                <a:schemeClr val="tx1"/>
+              </a:solidFill>
+            </a:ln>
+            <a:effectLst/>
+          </p:spPr>
+          <p:style>
+            <a:lnRef idx="1">
+              <a:schemeClr val="accent1"/>
+            </a:lnRef>
+            <a:fillRef idx="3">
+              <a:schemeClr val="accent1"/>
+            </a:fillRef>
+            <a:effectRef idx="2">
+              <a:schemeClr val="accent1"/>
+            </a:effectRef>
+            <a:fontRef idx="minor">
+              <a:schemeClr val="lt1"/>
+            </a:fontRef>
+          </p:style>
+          <p:txBody>
+            <a:bodyPr lIns="274320" tIns="182880" rIns="274320" bIns="182880" rtlCol="0" anchor="ctr"/>
+            <a:lstStyle/>
+            <a:p>
+              <a:pPr algn="ctr"/>
+              <a:r>
+                <a:rPr lang="en-US" dirty="0">
+                  <a:solidFill>
+                    <a:schemeClr val="tx1"/>
+                  </a:solidFill>
+                  <a:latin typeface="Proxima Nova" charset="0"/>
+                  <a:ea typeface="Proxima Nova" charset="0"/>
+                  <a:cs typeface="Proxima Nova" charset="0"/>
+                </a:rPr>
+                <a:t>1</a:t>
+              </a:r>
+            </a:p>
+          </p:txBody>
+        </p:sp>
+        <p:sp>
+          <p:nvSpPr>
+            <p:cNvPr id="5" name="Rectangle 4">
+              <a:extLst>
+                <a:ext uri="{FF2B5EF4-FFF2-40B4-BE49-F238E27FC236}">
+                  <a16:creationId xmlns:a16="http://schemas.microsoft.com/office/drawing/2014/main" id="{07C2B6ED-1014-4D01-8693-760A73FC389A}"/>
+                </a:ext>
+              </a:extLst>
+            </p:cNvPr>
+            <p:cNvSpPr/>
+            <p:nvPr/>
+          </p:nvSpPr>
+          <p:spPr>
+            <a:xfrm>
+              <a:off x="8781143" y="2329543"/>
+              <a:ext cx="667658" cy="464457"/>
+            </a:xfrm>
+            <a:prstGeom prst="rect">
+              <a:avLst/>
+            </a:prstGeom>
+            <a:solidFill>
+              <a:schemeClr val="bg1"/>
+            </a:solidFill>
+            <a:ln>
+              <a:solidFill>
+                <a:schemeClr val="tx1"/>
+              </a:solidFill>
+            </a:ln>
+            <a:effectLst/>
+          </p:spPr>
+          <p:style>
+            <a:lnRef idx="1">
+              <a:schemeClr val="accent1"/>
+            </a:lnRef>
+            <a:fillRef idx="3">
+              <a:schemeClr val="accent1"/>
+            </a:fillRef>
+            <a:effectRef idx="2">
+              <a:schemeClr val="accent1"/>
+            </a:effectRef>
+            <a:fontRef idx="minor">
+              <a:schemeClr val="lt1"/>
+            </a:fontRef>
+          </p:style>
+          <p:txBody>
+            <a:bodyPr lIns="274320" tIns="182880" rIns="274320" bIns="182880" rtlCol="0" anchor="ctr"/>
+            <a:lstStyle/>
+            <a:p>
+              <a:pPr algn="ctr"/>
+              <a:r>
+                <a:rPr lang="en-US" dirty="0">
+                  <a:solidFill>
+                    <a:schemeClr val="tx1"/>
+                  </a:solidFill>
+                  <a:latin typeface="Proxima Nova" charset="0"/>
+                  <a:ea typeface="Proxima Nova" charset="0"/>
+                  <a:cs typeface="Proxima Nova" charset="0"/>
+                </a:rPr>
+                <a:t>@</a:t>
+              </a:r>
+            </a:p>
+          </p:txBody>
+        </p:sp>
+        <p:sp>
+          <p:nvSpPr>
+            <p:cNvPr id="6" name="Rectangle 5">
+              <a:extLst>
+                <a:ext uri="{FF2B5EF4-FFF2-40B4-BE49-F238E27FC236}">
+                  <a16:creationId xmlns:a16="http://schemas.microsoft.com/office/drawing/2014/main" id="{348418BD-36A7-40EE-967A-BB0285FA0716}"/>
+                </a:ext>
+              </a:extLst>
+            </p:cNvPr>
+            <p:cNvSpPr/>
+            <p:nvPr/>
+          </p:nvSpPr>
+          <p:spPr>
+            <a:xfrm>
+              <a:off x="8781143" y="2794000"/>
+              <a:ext cx="667658" cy="464457"/>
+            </a:xfrm>
+            <a:prstGeom prst="rect">
+              <a:avLst/>
+            </a:prstGeom>
+            <a:solidFill>
+              <a:schemeClr val="bg1"/>
+            </a:solidFill>
+            <a:ln>
+              <a:solidFill>
+                <a:schemeClr val="tx1"/>
+              </a:solidFill>
+            </a:ln>
+            <a:effectLst/>
+          </p:spPr>
+          <p:style>
+            <a:lnRef idx="1">
+              <a:schemeClr val="accent1"/>
+            </a:lnRef>
+            <a:fillRef idx="3">
+              <a:schemeClr val="accent1"/>
+            </a:fillRef>
+            <a:effectRef idx="2">
+              <a:schemeClr val="accent1"/>
+            </a:effectRef>
+            <a:fontRef idx="minor">
+              <a:schemeClr val="lt1"/>
+            </a:fontRef>
+          </p:style>
+          <p:txBody>
+            <a:bodyPr lIns="274320" tIns="182880" rIns="274320" bIns="182880" rtlCol="0" anchor="ctr"/>
+            <a:lstStyle/>
+            <a:p>
+              <a:pPr algn="ctr"/>
+              <a:r>
+                <a:rPr lang="en-US" dirty="0">
+                  <a:solidFill>
+                    <a:schemeClr val="tx1"/>
+                  </a:solidFill>
+                  <a:latin typeface="Proxima Nova" charset="0"/>
+                  <a:ea typeface="Proxima Nova" charset="0"/>
+                  <a:cs typeface="Proxima Nova" charset="0"/>
+                </a:rPr>
+                <a:t>4</a:t>
+              </a:r>
+            </a:p>
+          </p:txBody>
+        </p:sp>
+        <p:sp>
+          <p:nvSpPr>
+            <p:cNvPr id="7" name="Rectangle 6">
+              <a:extLst>
+                <a:ext uri="{FF2B5EF4-FFF2-40B4-BE49-F238E27FC236}">
+                  <a16:creationId xmlns:a16="http://schemas.microsoft.com/office/drawing/2014/main" id="{0EC04C8D-5930-4F21-9EB4-5B14BCB7B778}"/>
+                </a:ext>
+              </a:extLst>
+            </p:cNvPr>
+            <p:cNvSpPr/>
+            <p:nvPr/>
+          </p:nvSpPr>
+          <p:spPr>
+            <a:xfrm>
+              <a:off x="8781143" y="3258457"/>
+              <a:ext cx="667658" cy="464457"/>
+            </a:xfrm>
+            <a:prstGeom prst="rect">
+              <a:avLst/>
+            </a:prstGeom>
+            <a:solidFill>
+              <a:schemeClr val="bg1"/>
+            </a:solidFill>
+            <a:ln>
+              <a:solidFill>
+                <a:schemeClr val="tx1"/>
+              </a:solidFill>
+            </a:ln>
+            <a:effectLst/>
+          </p:spPr>
+          <p:style>
+            <a:lnRef idx="1">
+              <a:schemeClr val="accent1"/>
+            </a:lnRef>
+            <a:fillRef idx="3">
+              <a:schemeClr val="accent1"/>
+            </a:fillRef>
+            <a:effectRef idx="2">
+              <a:schemeClr val="accent1"/>
+            </a:effectRef>
+            <a:fontRef idx="minor">
+              <a:schemeClr val="lt1"/>
+            </a:fontRef>
+          </p:style>
+          <p:txBody>
+            <a:bodyPr lIns="274320" tIns="182880" rIns="274320" bIns="182880" rtlCol="0" anchor="ctr"/>
+            <a:lstStyle/>
+            <a:p>
+              <a:pPr algn="ctr"/>
+              <a:r>
+                <a:rPr lang="en-US" dirty="0">
+                  <a:solidFill>
+                    <a:schemeClr val="tx1"/>
+                  </a:solidFill>
+                  <a:latin typeface="Proxima Nova" charset="0"/>
+                  <a:ea typeface="Proxima Nova" charset="0"/>
+                  <a:cs typeface="Proxima Nova" charset="0"/>
+                </a:rPr>
+                <a:t>3</a:t>
+              </a:r>
+            </a:p>
+          </p:txBody>
+        </p:sp>
+        <p:sp>
+          <p:nvSpPr>
+            <p:cNvPr id="8" name="Rectangle 7">
+              <a:extLst>
+                <a:ext uri="{FF2B5EF4-FFF2-40B4-BE49-F238E27FC236}">
+                  <a16:creationId xmlns:a16="http://schemas.microsoft.com/office/drawing/2014/main" id="{622EB696-171F-4F22-95B9-010CABD08F55}"/>
+                </a:ext>
+              </a:extLst>
+            </p:cNvPr>
+            <p:cNvSpPr/>
+            <p:nvPr/>
+          </p:nvSpPr>
+          <p:spPr>
+            <a:xfrm>
+              <a:off x="8781143" y="3653971"/>
+              <a:ext cx="667658" cy="464457"/>
+            </a:xfrm>
+            <a:prstGeom prst="rect">
+              <a:avLst/>
+            </a:prstGeom>
+            <a:solidFill>
+              <a:schemeClr val="bg1"/>
+            </a:solidFill>
+            <a:ln>
+              <a:solidFill>
+                <a:schemeClr val="tx1"/>
+              </a:solidFill>
+            </a:ln>
+            <a:effectLst/>
+          </p:spPr>
+          <p:style>
+            <a:lnRef idx="1">
+              <a:schemeClr val="accent1"/>
+            </a:lnRef>
+            <a:fillRef idx="3">
+              <a:schemeClr val="accent1"/>
+            </a:fillRef>
+            <a:effectRef idx="2">
+              <a:schemeClr val="accent1"/>
+            </a:effectRef>
+            <a:fontRef idx="minor">
+              <a:schemeClr val="lt1"/>
+            </a:fontRef>
+          </p:style>
+          <p:txBody>
+            <a:bodyPr lIns="274320" tIns="182880" rIns="274320" bIns="182880" rtlCol="0" anchor="ctr"/>
+            <a:lstStyle/>
+            <a:p>
+              <a:pPr algn="ctr"/>
+              <a:r>
+                <a:rPr lang="en-US" dirty="0">
+                  <a:solidFill>
+                    <a:schemeClr val="tx1"/>
+                  </a:solidFill>
+                  <a:latin typeface="Proxima Nova" charset="0"/>
+                  <a:ea typeface="Proxima Nova" charset="0"/>
+                  <a:cs typeface="Proxima Nova" charset="0"/>
+                </a:rPr>
+                <a:t>@</a:t>
+              </a:r>
+            </a:p>
+          </p:txBody>
+        </p:sp>
+        <p:sp>
+          <p:nvSpPr>
+            <p:cNvPr id="9" name="Rectangle 8">
+              <a:extLst>
+                <a:ext uri="{FF2B5EF4-FFF2-40B4-BE49-F238E27FC236}">
+                  <a16:creationId xmlns:a16="http://schemas.microsoft.com/office/drawing/2014/main" id="{51A4DC22-2A71-4B4C-B83E-4528A7AF6ED8}"/>
+                </a:ext>
+              </a:extLst>
+            </p:cNvPr>
+            <p:cNvSpPr/>
+            <p:nvPr/>
+          </p:nvSpPr>
+          <p:spPr>
+            <a:xfrm>
+              <a:off x="8781143" y="4120946"/>
+              <a:ext cx="667658" cy="464457"/>
+            </a:xfrm>
+            <a:prstGeom prst="rect">
+              <a:avLst/>
+            </a:prstGeom>
+            <a:solidFill>
+              <a:schemeClr val="bg1"/>
+            </a:solidFill>
+            <a:ln>
+              <a:solidFill>
+                <a:schemeClr val="tx1"/>
+              </a:solidFill>
+            </a:ln>
+            <a:effectLst/>
+          </p:spPr>
+          <p:style>
+            <a:lnRef idx="1">
+              <a:schemeClr val="accent1"/>
+            </a:lnRef>
+            <a:fillRef idx="3">
+              <a:schemeClr val="accent1"/>
+            </a:fillRef>
+            <a:effectRef idx="2">
+              <a:schemeClr val="accent1"/>
+            </a:effectRef>
+            <a:fontRef idx="minor">
+              <a:schemeClr val="lt1"/>
+            </a:fontRef>
+          </p:style>
+          <p:txBody>
+            <a:bodyPr lIns="274320" tIns="182880" rIns="274320" bIns="182880" rtlCol="0" anchor="ctr"/>
+            <a:lstStyle/>
+            <a:p>
+              <a:pPr algn="ctr"/>
+              <a:r>
+                <a:rPr lang="en-US" dirty="0">
+                  <a:solidFill>
+                    <a:schemeClr val="tx1"/>
+                  </a:solidFill>
+                  <a:latin typeface="Proxima Nova" charset="0"/>
+                  <a:ea typeface="Proxima Nova" charset="0"/>
+                  <a:cs typeface="Proxima Nova" charset="0"/>
+                </a:rPr>
+                <a:t>1</a:t>
+              </a:r>
+            </a:p>
+          </p:txBody>
+        </p:sp>
+      </p:grpSp>
+      <p:grpSp>
+        <p:nvGrpSpPr>
+          <p:cNvPr id="22" name="Group 21">
+            <a:extLst>
+              <a:ext uri="{FF2B5EF4-FFF2-40B4-BE49-F238E27FC236}">
+                <a16:creationId xmlns:a16="http://schemas.microsoft.com/office/drawing/2014/main" id="{BACA9480-DF01-401E-BA6C-76619C7D2756}"/>
+              </a:ext>
+            </a:extLst>
+          </p:cNvPr>
+          <p:cNvGrpSpPr/>
+          <p:nvPr/>
+        </p:nvGrpSpPr>
+        <p:grpSpPr>
+          <a:xfrm>
+            <a:off x="10704286" y="2710409"/>
+            <a:ext cx="2024744" cy="464457"/>
+            <a:chOff x="10515600" y="2412866"/>
+            <a:chExt cx="2024744" cy="464457"/>
+          </a:xfrm>
+        </p:grpSpPr>
+        <p:sp>
+          <p:nvSpPr>
+            <p:cNvPr id="10" name="Rectangle 9">
+              <a:extLst>
+                <a:ext uri="{FF2B5EF4-FFF2-40B4-BE49-F238E27FC236}">
+                  <a16:creationId xmlns:a16="http://schemas.microsoft.com/office/drawing/2014/main" id="{5AE46A59-851B-4A3F-914E-9C4111518B29}"/>
+                </a:ext>
+              </a:extLst>
+            </p:cNvPr>
+            <p:cNvSpPr/>
+            <p:nvPr/>
+          </p:nvSpPr>
+          <p:spPr>
+            <a:xfrm>
+              <a:off x="10515600" y="2412866"/>
+              <a:ext cx="667658" cy="464457"/>
+            </a:xfrm>
+            <a:prstGeom prst="rect">
+              <a:avLst/>
+            </a:prstGeom>
+            <a:solidFill>
+              <a:schemeClr val="bg1"/>
+            </a:solidFill>
+            <a:ln>
+              <a:solidFill>
+                <a:schemeClr val="tx1"/>
+              </a:solidFill>
+            </a:ln>
+            <a:effectLst/>
+          </p:spPr>
+          <p:style>
+            <a:lnRef idx="1">
+              <a:schemeClr val="accent1"/>
+            </a:lnRef>
+            <a:fillRef idx="3">
+              <a:schemeClr val="accent1"/>
+            </a:fillRef>
+            <a:effectRef idx="2">
+              <a:schemeClr val="accent1"/>
+            </a:effectRef>
+            <a:fontRef idx="minor">
+              <a:schemeClr val="lt1"/>
+            </a:fontRef>
+          </p:style>
+          <p:txBody>
+            <a:bodyPr lIns="274320" tIns="182880" rIns="274320" bIns="182880" rtlCol="0" anchor="ctr"/>
+            <a:lstStyle/>
+            <a:p>
+              <a:pPr algn="ctr"/>
+              <a:r>
+                <a:rPr lang="en-US" dirty="0">
+                  <a:solidFill>
+                    <a:schemeClr val="tx1"/>
+                  </a:solidFill>
+                  <a:latin typeface="Proxima Nova" charset="0"/>
+                  <a:ea typeface="Proxima Nova" charset="0"/>
+                  <a:cs typeface="Proxima Nova" charset="0"/>
+                </a:rPr>
+                <a:t>1</a:t>
+              </a:r>
+            </a:p>
+          </p:txBody>
+        </p:sp>
+        <p:sp>
+          <p:nvSpPr>
+            <p:cNvPr id="11" name="Rectangle 10">
+              <a:extLst>
+                <a:ext uri="{FF2B5EF4-FFF2-40B4-BE49-F238E27FC236}">
+                  <a16:creationId xmlns:a16="http://schemas.microsoft.com/office/drawing/2014/main" id="{2183CB20-4FAF-4B0A-8A1E-CC96BE77929B}"/>
+                </a:ext>
+              </a:extLst>
+            </p:cNvPr>
+            <p:cNvSpPr/>
+            <p:nvPr/>
+          </p:nvSpPr>
+          <p:spPr>
+            <a:xfrm>
+              <a:off x="11183258" y="2412866"/>
+              <a:ext cx="667658" cy="464457"/>
+            </a:xfrm>
+            <a:prstGeom prst="rect">
+              <a:avLst/>
+            </a:prstGeom>
+            <a:solidFill>
+              <a:schemeClr val="bg1"/>
+            </a:solidFill>
+            <a:ln>
+              <a:solidFill>
+                <a:schemeClr val="tx1"/>
+              </a:solidFill>
+            </a:ln>
+            <a:effectLst/>
+          </p:spPr>
+          <p:style>
+            <a:lnRef idx="1">
+              <a:schemeClr val="accent1"/>
+            </a:lnRef>
+            <a:fillRef idx="3">
+              <a:schemeClr val="accent1"/>
+            </a:fillRef>
+            <a:effectRef idx="2">
+              <a:schemeClr val="accent1"/>
+            </a:effectRef>
+            <a:fontRef idx="minor">
+              <a:schemeClr val="lt1"/>
+            </a:fontRef>
+          </p:style>
+          <p:txBody>
+            <a:bodyPr lIns="274320" tIns="182880" rIns="274320" bIns="182880" rtlCol="0" anchor="ctr"/>
+            <a:lstStyle/>
+            <a:p>
+              <a:pPr algn="ctr"/>
+              <a:r>
+                <a:rPr lang="en-US" dirty="0">
+                  <a:solidFill>
+                    <a:schemeClr val="tx1"/>
+                  </a:solidFill>
+                  <a:latin typeface="Proxima Nova" charset="0"/>
+                  <a:ea typeface="Proxima Nova" charset="0"/>
+                  <a:cs typeface="Proxima Nova" charset="0"/>
+                </a:rPr>
+                <a:t>4</a:t>
+              </a:r>
+            </a:p>
+          </p:txBody>
+        </p:sp>
+        <p:sp>
+          <p:nvSpPr>
+            <p:cNvPr id="12" name="Rectangle 11">
+              <a:extLst>
+                <a:ext uri="{FF2B5EF4-FFF2-40B4-BE49-F238E27FC236}">
+                  <a16:creationId xmlns:a16="http://schemas.microsoft.com/office/drawing/2014/main" id="{B8093178-B24D-4B0E-8E47-C6A8E3473642}"/>
+                </a:ext>
+              </a:extLst>
+            </p:cNvPr>
+            <p:cNvSpPr/>
+            <p:nvPr/>
+          </p:nvSpPr>
+          <p:spPr>
+            <a:xfrm>
+              <a:off x="11872686" y="2412866"/>
+              <a:ext cx="667658" cy="464457"/>
+            </a:xfrm>
+            <a:prstGeom prst="rect">
+              <a:avLst/>
+            </a:prstGeom>
+            <a:solidFill>
+              <a:schemeClr val="bg1"/>
+            </a:solidFill>
+            <a:ln>
+              <a:solidFill>
+                <a:schemeClr val="tx1"/>
+              </a:solidFill>
+            </a:ln>
+            <a:effectLst/>
+          </p:spPr>
+          <p:style>
+            <a:lnRef idx="1">
+              <a:schemeClr val="accent1"/>
+            </a:lnRef>
+            <a:fillRef idx="3">
+              <a:schemeClr val="accent1"/>
+            </a:fillRef>
+            <a:effectRef idx="2">
+              <a:schemeClr val="accent1"/>
+            </a:effectRef>
+            <a:fontRef idx="minor">
+              <a:schemeClr val="lt1"/>
+            </a:fontRef>
+          </p:style>
+          <p:txBody>
+            <a:bodyPr lIns="274320" tIns="182880" rIns="274320" bIns="182880" rtlCol="0" anchor="ctr"/>
+            <a:lstStyle/>
+            <a:p>
+              <a:pPr algn="ctr"/>
+              <a:r>
+                <a:rPr lang="en-US" dirty="0">
+                  <a:solidFill>
+                    <a:schemeClr val="tx1"/>
+                  </a:solidFill>
+                  <a:latin typeface="Proxima Nova" charset="0"/>
+                  <a:ea typeface="Proxima Nova" charset="0"/>
+                  <a:cs typeface="Proxima Nova" charset="0"/>
+                </a:rPr>
+                <a:t>4</a:t>
+              </a:r>
+            </a:p>
+          </p:txBody>
+        </p:sp>
+      </p:grpSp>
+      <p:grpSp>
+        <p:nvGrpSpPr>
+          <p:cNvPr id="21" name="Group 20">
+            <a:extLst>
+              <a:ext uri="{FF2B5EF4-FFF2-40B4-BE49-F238E27FC236}">
+                <a16:creationId xmlns:a16="http://schemas.microsoft.com/office/drawing/2014/main" id="{2D0FE084-6376-4A0D-A978-FE948449AAE7}"/>
+              </a:ext>
+            </a:extLst>
+          </p:cNvPr>
+          <p:cNvGrpSpPr/>
+          <p:nvPr/>
+        </p:nvGrpSpPr>
+        <p:grpSpPr>
+          <a:xfrm>
+            <a:off x="10384971" y="3970182"/>
+            <a:ext cx="1335316" cy="464457"/>
+            <a:chOff x="10181771" y="3653971"/>
+            <a:chExt cx="1335316" cy="464457"/>
+          </a:xfrm>
+        </p:grpSpPr>
+        <p:sp>
+          <p:nvSpPr>
+            <p:cNvPr id="14" name="Rectangle 13">
+              <a:extLst>
+                <a:ext uri="{FF2B5EF4-FFF2-40B4-BE49-F238E27FC236}">
+                  <a16:creationId xmlns:a16="http://schemas.microsoft.com/office/drawing/2014/main" id="{32FF1CF3-AA79-463A-BA9E-14A042D68D94}"/>
+                </a:ext>
+              </a:extLst>
+            </p:cNvPr>
+            <p:cNvSpPr/>
+            <p:nvPr/>
+          </p:nvSpPr>
+          <p:spPr>
+            <a:xfrm>
+              <a:off x="10181771" y="3653971"/>
+              <a:ext cx="667658" cy="464457"/>
+            </a:xfrm>
+            <a:prstGeom prst="rect">
+              <a:avLst/>
+            </a:prstGeom>
+            <a:solidFill>
+              <a:schemeClr val="bg1"/>
+            </a:solidFill>
+            <a:ln>
+              <a:solidFill>
+                <a:schemeClr val="tx1"/>
+              </a:solidFill>
+            </a:ln>
+            <a:effectLst/>
+          </p:spPr>
+          <p:style>
+            <a:lnRef idx="1">
+              <a:schemeClr val="accent1"/>
+            </a:lnRef>
+            <a:fillRef idx="3">
+              <a:schemeClr val="accent1"/>
+            </a:fillRef>
+            <a:effectRef idx="2">
+              <a:schemeClr val="accent1"/>
+            </a:effectRef>
+            <a:fontRef idx="minor">
+              <a:schemeClr val="lt1"/>
+            </a:fontRef>
+          </p:style>
+          <p:txBody>
+            <a:bodyPr lIns="274320" tIns="182880" rIns="274320" bIns="182880" rtlCol="0" anchor="ctr"/>
+            <a:lstStyle/>
+            <a:p>
+              <a:pPr algn="ctr"/>
+              <a:r>
+                <a:rPr lang="en-US" dirty="0">
+                  <a:solidFill>
+                    <a:schemeClr val="tx1"/>
+                  </a:solidFill>
+                  <a:latin typeface="Proxima Nova" charset="0"/>
+                  <a:ea typeface="Proxima Nova" charset="0"/>
+                  <a:cs typeface="Proxima Nova" charset="0"/>
+                </a:rPr>
+                <a:t>2</a:t>
+              </a:r>
+            </a:p>
+          </p:txBody>
+        </p:sp>
+        <p:sp>
+          <p:nvSpPr>
+            <p:cNvPr id="15" name="Rectangle 14">
+              <a:extLst>
+                <a:ext uri="{FF2B5EF4-FFF2-40B4-BE49-F238E27FC236}">
+                  <a16:creationId xmlns:a16="http://schemas.microsoft.com/office/drawing/2014/main" id="{8B0AA0FD-B865-4354-8C79-F8BB97EDB5B9}"/>
+                </a:ext>
+              </a:extLst>
+            </p:cNvPr>
+            <p:cNvSpPr/>
+            <p:nvPr/>
+          </p:nvSpPr>
+          <p:spPr>
+            <a:xfrm>
+              <a:off x="10849429" y="3653971"/>
+              <a:ext cx="667658" cy="464457"/>
+            </a:xfrm>
+            <a:prstGeom prst="rect">
+              <a:avLst/>
+            </a:prstGeom>
+            <a:solidFill>
+              <a:schemeClr val="bg1"/>
+            </a:solidFill>
+            <a:ln>
+              <a:solidFill>
+                <a:schemeClr val="tx1"/>
+              </a:solidFill>
+            </a:ln>
+            <a:effectLst/>
+          </p:spPr>
+          <p:style>
+            <a:lnRef idx="1">
+              <a:schemeClr val="accent1"/>
+            </a:lnRef>
+            <a:fillRef idx="3">
+              <a:schemeClr val="accent1"/>
+            </a:fillRef>
+            <a:effectRef idx="2">
+              <a:schemeClr val="accent1"/>
+            </a:effectRef>
+            <a:fontRef idx="minor">
+              <a:schemeClr val="lt1"/>
+            </a:fontRef>
+          </p:style>
+          <p:txBody>
+            <a:bodyPr lIns="274320" tIns="182880" rIns="274320" bIns="182880" rtlCol="0" anchor="ctr"/>
+            <a:lstStyle/>
+            <a:p>
+              <a:pPr algn="ctr"/>
+              <a:r>
+                <a:rPr lang="en-US" dirty="0">
+                  <a:solidFill>
+                    <a:schemeClr val="tx1"/>
+                  </a:solidFill>
+                  <a:latin typeface="Proxima Nova" charset="0"/>
+                  <a:ea typeface="Proxima Nova" charset="0"/>
+                  <a:cs typeface="Proxima Nova" charset="0"/>
+                </a:rPr>
+                <a:t>@</a:t>
+              </a:r>
+            </a:p>
+          </p:txBody>
+        </p:sp>
+      </p:grpSp>
+      <p:cxnSp>
+        <p:nvCxnSpPr>
+          <p:cNvPr id="18" name="Connector: Curved 17">
+            <a:extLst>
+              <a:ext uri="{FF2B5EF4-FFF2-40B4-BE49-F238E27FC236}">
+                <a16:creationId xmlns:a16="http://schemas.microsoft.com/office/drawing/2014/main" id="{28C433B0-8E9A-493C-922B-88F6BFAE9614}"/>
+              </a:ext>
+            </a:extLst>
+          </p:cNvPr>
+          <p:cNvCxnSpPr>
+            <a:stCxn id="5" idx="3"/>
+            <a:endCxn id="10" idx="1"/>
+          </p:cNvCxnSpPr>
+          <p:nvPr/>
+        </p:nvCxnSpPr>
+        <p:spPr>
+          <a:xfrm>
+            <a:off x="9622972" y="2561772"/>
+            <a:ext cx="1081314" cy="380866"/>
+          </a:xfrm>
+          <a:prstGeom prst="curvedConnector3">
+            <a:avLst/>
+          </a:prstGeom>
+          <a:ln>
+            <a:tailEnd type="triangle"/>
+          </a:ln>
+        </p:spPr>
+        <p:style>
+          <a:lnRef idx="2">
+            <a:schemeClr val="accent1"/>
+          </a:lnRef>
+          <a:fillRef idx="0">
+            <a:schemeClr val="accent1"/>
+          </a:fillRef>
+          <a:effectRef idx="1">
+            <a:schemeClr val="accent1"/>
+          </a:effectRef>
+          <a:fontRef idx="minor">
+            <a:schemeClr val="tx1"/>
+          </a:fontRef>
+        </p:style>
+      </p:cxnSp>
+      <p:cxnSp>
+        <p:nvCxnSpPr>
+          <p:cNvPr id="20" name="Connector: Curved 19">
+            <a:extLst>
+              <a:ext uri="{FF2B5EF4-FFF2-40B4-BE49-F238E27FC236}">
+                <a16:creationId xmlns:a16="http://schemas.microsoft.com/office/drawing/2014/main" id="{9BBE85EA-D346-4670-AAE8-B78F526D7C4B}"/>
+              </a:ext>
+            </a:extLst>
+          </p:cNvPr>
+          <p:cNvCxnSpPr>
+            <a:stCxn id="8" idx="3"/>
+            <a:endCxn id="14" idx="1"/>
+          </p:cNvCxnSpPr>
+          <p:nvPr/>
+        </p:nvCxnSpPr>
+        <p:spPr>
+          <a:xfrm>
+            <a:off x="9622972" y="3886200"/>
+            <a:ext cx="761999" cy="316211"/>
+          </a:xfrm>
+          <a:prstGeom prst="curvedConnector3">
+            <a:avLst/>
+          </a:prstGeom>
+          <a:ln>
+            <a:tailEnd type="triangle"/>
+          </a:ln>
+        </p:spPr>
+        <p:style>
+          <a:lnRef idx="2">
+            <a:schemeClr val="accent1"/>
+          </a:lnRef>
+          <a:fillRef idx="0">
+            <a:schemeClr val="accent1"/>
+          </a:fillRef>
+          <a:effectRef idx="1">
+            <a:schemeClr val="accent1"/>
+          </a:effectRef>
+          <a:fontRef idx="minor">
+            <a:schemeClr val="tx1"/>
+          </a:fontRef>
+        </p:style>
+      </p:cxnSp>
+      <p:grpSp>
+        <p:nvGrpSpPr>
+          <p:cNvPr id="24" name="Group 23">
+            <a:extLst>
+              <a:ext uri="{FF2B5EF4-FFF2-40B4-BE49-F238E27FC236}">
+                <a16:creationId xmlns:a16="http://schemas.microsoft.com/office/drawing/2014/main" id="{9DC89338-A058-4DDF-9885-BEA0E8B3BD88}"/>
+              </a:ext>
+            </a:extLst>
+          </p:cNvPr>
+          <p:cNvGrpSpPr/>
+          <p:nvPr/>
+        </p:nvGrpSpPr>
+        <p:grpSpPr>
+          <a:xfrm>
+            <a:off x="11727543" y="4934909"/>
+            <a:ext cx="1335316" cy="464457"/>
+            <a:chOff x="10181771" y="3653971"/>
+            <a:chExt cx="1335316" cy="464457"/>
+          </a:xfrm>
+        </p:grpSpPr>
+        <p:sp>
+          <p:nvSpPr>
+            <p:cNvPr id="25" name="Rectangle 24">
+              <a:extLst>
+                <a:ext uri="{FF2B5EF4-FFF2-40B4-BE49-F238E27FC236}">
+                  <a16:creationId xmlns:a16="http://schemas.microsoft.com/office/drawing/2014/main" id="{9CAE9D0B-036A-4F28-B891-00F106200D45}"/>
+                </a:ext>
+              </a:extLst>
+            </p:cNvPr>
+            <p:cNvSpPr/>
+            <p:nvPr/>
+          </p:nvSpPr>
+          <p:spPr>
+            <a:xfrm>
+              <a:off x="10181771" y="3653971"/>
+              <a:ext cx="667658" cy="464457"/>
+            </a:xfrm>
+            <a:prstGeom prst="rect">
+              <a:avLst/>
+            </a:prstGeom>
+            <a:solidFill>
+              <a:schemeClr val="bg1"/>
+            </a:solidFill>
+            <a:ln>
+              <a:solidFill>
+                <a:schemeClr val="tx1"/>
+              </a:solidFill>
+            </a:ln>
+            <a:effectLst/>
+          </p:spPr>
+          <p:style>
+            <a:lnRef idx="1">
+              <a:schemeClr val="accent1"/>
+            </a:lnRef>
+            <a:fillRef idx="3">
+              <a:schemeClr val="accent1"/>
+            </a:fillRef>
+            <a:effectRef idx="2">
+              <a:schemeClr val="accent1"/>
+            </a:effectRef>
+            <a:fontRef idx="minor">
+              <a:schemeClr val="lt1"/>
+            </a:fontRef>
+          </p:style>
+          <p:txBody>
+            <a:bodyPr lIns="274320" tIns="182880" rIns="274320" bIns="182880" rtlCol="0" anchor="ctr"/>
+            <a:lstStyle/>
+            <a:p>
+              <a:pPr algn="ctr"/>
+              <a:r>
+                <a:rPr lang="en-US" dirty="0">
+                  <a:solidFill>
+                    <a:schemeClr val="tx1"/>
+                  </a:solidFill>
+                  <a:latin typeface="Proxima Nova" charset="0"/>
+                  <a:ea typeface="Proxima Nova" charset="0"/>
+                  <a:cs typeface="Proxima Nova" charset="0"/>
+                </a:rPr>
+                <a:t>4</a:t>
+              </a:r>
+            </a:p>
+          </p:txBody>
+        </p:sp>
+        <p:sp>
+          <p:nvSpPr>
+            <p:cNvPr id="26" name="Rectangle 25">
+              <a:extLst>
+                <a:ext uri="{FF2B5EF4-FFF2-40B4-BE49-F238E27FC236}">
+                  <a16:creationId xmlns:a16="http://schemas.microsoft.com/office/drawing/2014/main" id="{D93A0E59-C5B7-4A27-AB99-035491ED8EE3}"/>
+                </a:ext>
+              </a:extLst>
+            </p:cNvPr>
+            <p:cNvSpPr/>
+            <p:nvPr/>
+          </p:nvSpPr>
+          <p:spPr>
+            <a:xfrm>
+              <a:off x="10849429" y="3653971"/>
+              <a:ext cx="667658" cy="464457"/>
+            </a:xfrm>
+            <a:prstGeom prst="rect">
+              <a:avLst/>
+            </a:prstGeom>
+            <a:solidFill>
+              <a:schemeClr val="bg1"/>
+            </a:solidFill>
+            <a:ln>
+              <a:solidFill>
+                <a:schemeClr val="tx1"/>
+              </a:solidFill>
+            </a:ln>
+            <a:effectLst/>
+          </p:spPr>
+          <p:style>
+            <a:lnRef idx="1">
+              <a:schemeClr val="accent1"/>
+            </a:lnRef>
+            <a:fillRef idx="3">
+              <a:schemeClr val="accent1"/>
+            </a:fillRef>
+            <a:effectRef idx="2">
+              <a:schemeClr val="accent1"/>
+            </a:effectRef>
+            <a:fontRef idx="minor">
+              <a:schemeClr val="lt1"/>
+            </a:fontRef>
+          </p:style>
+          <p:txBody>
+            <a:bodyPr lIns="274320" tIns="182880" rIns="274320" bIns="182880" rtlCol="0" anchor="ctr"/>
+            <a:lstStyle/>
+            <a:p>
+              <a:pPr algn="ctr"/>
+              <a:r>
+                <a:rPr lang="en-US" dirty="0">
+                  <a:solidFill>
+                    <a:schemeClr val="tx1"/>
+                  </a:solidFill>
+                  <a:latin typeface="Proxima Nova" charset="0"/>
+                  <a:ea typeface="Proxima Nova" charset="0"/>
+                  <a:cs typeface="Proxima Nova" charset="0"/>
+                </a:rPr>
+                <a:t>2</a:t>
+              </a:r>
+            </a:p>
+          </p:txBody>
+        </p:sp>
+      </p:grpSp>
+      <p:cxnSp>
+        <p:nvCxnSpPr>
+          <p:cNvPr id="27" name="Connector: Curved 26">
+            <a:extLst>
+              <a:ext uri="{FF2B5EF4-FFF2-40B4-BE49-F238E27FC236}">
+                <a16:creationId xmlns:a16="http://schemas.microsoft.com/office/drawing/2014/main" id="{BCADD73C-3D20-4150-992A-E9A7049CBE2B}"/>
+              </a:ext>
+            </a:extLst>
+          </p:cNvPr>
+          <p:cNvCxnSpPr>
+            <a:cxnSpLocks/>
+            <a:stCxn id="15" idx="2"/>
+            <a:endCxn id="25" idx="1"/>
+          </p:cNvCxnSpPr>
+          <p:nvPr/>
+        </p:nvCxnSpPr>
+        <p:spPr>
+          <a:xfrm rot="16200000" flipH="1">
+            <a:off x="11190751" y="4630345"/>
+            <a:ext cx="732499" cy="341085"/>
+          </a:xfrm>
+          <a:prstGeom prst="curvedConnector2">
+            <a:avLst/>
+          </a:prstGeom>
+          <a:ln>
+            <a:tailEnd type="triangle"/>
+          </a:ln>
+        </p:spPr>
+        <p:style>
+          <a:lnRef idx="2">
+            <a:schemeClr val="accent1"/>
+          </a:lnRef>
+          <a:fillRef idx="0">
+            <a:schemeClr val="accent1"/>
+          </a:fillRef>
+          <a:effectRef idx="1">
+            <a:schemeClr val="accent1"/>
+          </a:effectRef>
+          <a:fontRef idx="minor">
+            <a:schemeClr val="tx1"/>
+          </a:fontRef>
+        </p:style>
+      </p:cxnSp>
+    </p:spTree>
+    <p:extLst>
+      <p:ext uri="{BB962C8B-B14F-4D97-AF65-F5344CB8AC3E}">
+        <p14:creationId xmlns:p14="http://schemas.microsoft.com/office/powerpoint/2010/main" val="1921385023"/>
+      </p:ext>
+    </p:extLst>
+  </p:cSld>
+  <p:clrMapOvr>
+    <a:masterClrMapping/>
+  </p:clrMapOvr>
+  <mc:AlternateContent xmlns:mc="http://schemas.openxmlformats.org/markup-compatibility/2006" xmlns:p14="http://schemas.microsoft.com/office/powerpoint/2010/main">
+    <mc:Choice Requires="p14">
+      <p:transition p14:dur="300">
+        <p:fade/>
+      </p:transition>
+    </mc:Choice>
+    <mc:Fallback xmlns="">
+      <p:transition>
+        <p:fade/>
+      </p:transition>
+    </mc:Fallback>
+  </mc:AlternateContent>
+</p:sld>
+</file>
+
+<file path=ppt/slides/slide9.xml><?xml version="1.0" encoding="utf-8"?>
+<p:sld xmlns:a="http://schemas.openxmlformats.org/drawingml/2006/main" xmlns:r="http://schemas.openxmlformats.org/officeDocument/2006/relationships" xmlns:p="http://schemas.openxmlformats.org/presentationml/2006/main">
+  <p:cSld>
+    <p:spTree>
+      <p:nvGrpSpPr>
+        <p:cNvPr id="1" name=""/>
+        <p:cNvGrpSpPr/>
+        <p:nvPr/>
+      </p:nvGrpSpPr>
+      <p:grpSpPr>
+        <a:xfrm>
+          <a:off x="0" y="0"/>
+          <a:ext cx="0" cy="0"/>
+          <a:chOff x="0" y="0"/>
+          <a:chExt cx="0" cy="0"/>
+        </a:xfrm>
+      </p:grpSpPr>
+      <p:sp>
+        <p:nvSpPr>
+          <p:cNvPr id="2" name="Title 1">
+            <a:extLst>
+              <a:ext uri="{FF2B5EF4-FFF2-40B4-BE49-F238E27FC236}">
+                <a16:creationId xmlns:a16="http://schemas.microsoft.com/office/drawing/2014/main" id="{1F4D2937-771D-4059-81E2-0BE706203D2E}"/>
+              </a:ext>
+            </a:extLst>
+          </p:cNvPr>
+          <p:cNvSpPr>
+            <a:spLocks noGrp="1"/>
+          </p:cNvSpPr>
+          <p:nvPr>
+            <p:ph type="title"/>
+          </p:nvPr>
+        </p:nvSpPr>
+        <p:spPr/>
+        <p:txBody>
+          <a:bodyPr/>
+          <a:lstStyle/>
+          <a:p>
+            <a:r>
+              <a:rPr lang="en-US" dirty="0"/>
+              <a:t>Sneak Peak Solution </a:t>
+            </a:r>
+          </a:p>
+        </p:txBody>
+      </p:sp>
+      <p:sp>
+        <p:nvSpPr>
+          <p:cNvPr id="7" name="TextBox 6">
+            <a:extLst>
+              <a:ext uri="{FF2B5EF4-FFF2-40B4-BE49-F238E27FC236}">
+                <a16:creationId xmlns:a16="http://schemas.microsoft.com/office/drawing/2014/main" id="{1BB35B00-C6AE-467D-B8BF-31C76D741E56}"/>
+              </a:ext>
+            </a:extLst>
+          </p:cNvPr>
+          <p:cNvSpPr txBox="1"/>
+          <p:nvPr/>
+        </p:nvSpPr>
+        <p:spPr>
+          <a:xfrm>
+            <a:off x="275770" y="1432473"/>
+            <a:ext cx="13062857" cy="5632311"/>
+          </a:xfrm>
+          <a:prstGeom prst="rect">
+            <a:avLst/>
+          </a:prstGeom>
+          <a:solidFill>
+            <a:schemeClr val="tx1"/>
+          </a:solidFill>
+        </p:spPr>
+        <p:txBody>
+          <a:bodyPr wrap="square">
+            <a:spAutoFit/>
+          </a:bodyPr>
+          <a:lstStyle/>
+          <a:p>
+            <a:r>
+              <a:rPr lang="en-US" b="0" dirty="0">
+                <a:solidFill>
+                  <a:srgbClr val="569CD6"/>
+                </a:solidFill>
+                <a:effectLst/>
+                <a:latin typeface="Consolas" panose="020B0609020204030204" pitchFamily="49" charset="0"/>
+              </a:rPr>
+              <a:t>public</a:t>
+            </a:r>
+            <a:r>
+              <a:rPr lang="en-US" b="0" dirty="0">
+                <a:solidFill>
+                  <a:srgbClr val="D4D4D4"/>
+                </a:solidFill>
+                <a:effectLst/>
+                <a:latin typeface="Consolas" panose="020B0609020204030204" pitchFamily="49" charset="0"/>
+              </a:rPr>
+              <a:t> </a:t>
+            </a:r>
+            <a:r>
+              <a:rPr lang="en-US" b="0" dirty="0">
+                <a:solidFill>
+                  <a:srgbClr val="569CD6"/>
+                </a:solidFill>
+                <a:effectLst/>
+                <a:latin typeface="Consolas" panose="020B0609020204030204" pitchFamily="49" charset="0"/>
+              </a:rPr>
+              <a:t>class</a:t>
+            </a:r>
+            <a:r>
+              <a:rPr lang="en-US" b="0" dirty="0">
+                <a:solidFill>
+                  <a:srgbClr val="D4D4D4"/>
+                </a:solidFill>
+                <a:effectLst/>
+                <a:latin typeface="Consolas" panose="020B0609020204030204" pitchFamily="49" charset="0"/>
+              </a:rPr>
+              <a:t> </a:t>
+            </a:r>
+            <a:r>
+              <a:rPr lang="en-US" b="0" dirty="0" err="1">
+                <a:solidFill>
+                  <a:srgbClr val="4EC9B0"/>
+                </a:solidFill>
+                <a:effectLst/>
+                <a:latin typeface="Consolas" panose="020B0609020204030204" pitchFamily="49" charset="0"/>
+              </a:rPr>
+              <a:t>RecursionExample</a:t>
+            </a:r>
+            <a:r>
+              <a:rPr lang="en-US" b="0" dirty="0">
+                <a:solidFill>
+                  <a:srgbClr val="D4D4D4"/>
+                </a:solidFill>
+                <a:effectLst/>
+                <a:latin typeface="Consolas" panose="020B0609020204030204" pitchFamily="49" charset="0"/>
+              </a:rPr>
+              <a:t> {</a:t>
+            </a:r>
+          </a:p>
+          <a:p>
+            <a:br>
+              <a:rPr lang="en-US" b="0" dirty="0">
+                <a:solidFill>
+                  <a:srgbClr val="D4D4D4"/>
+                </a:solidFill>
+                <a:effectLst/>
+                <a:latin typeface="Consolas" panose="020B0609020204030204" pitchFamily="49" charset="0"/>
+              </a:rPr>
+            </a:br>
+            <a:r>
+              <a:rPr lang="en-US" b="0" dirty="0">
+                <a:solidFill>
+                  <a:srgbClr val="D4D4D4"/>
+                </a:solidFill>
+                <a:effectLst/>
+                <a:latin typeface="Consolas" panose="020B0609020204030204" pitchFamily="49" charset="0"/>
+              </a:rPr>
+              <a:t>    </a:t>
+            </a:r>
+            <a:r>
+              <a:rPr lang="en-US" b="0" dirty="0">
+                <a:solidFill>
+                  <a:srgbClr val="569CD6"/>
+                </a:solidFill>
+                <a:effectLst/>
+                <a:latin typeface="Consolas" panose="020B0609020204030204" pitchFamily="49" charset="0"/>
+              </a:rPr>
+              <a:t>public</a:t>
+            </a:r>
+            <a:r>
+              <a:rPr lang="en-US" b="0" dirty="0">
+                <a:solidFill>
+                  <a:srgbClr val="D4D4D4"/>
+                </a:solidFill>
+                <a:effectLst/>
+                <a:latin typeface="Consolas" panose="020B0609020204030204" pitchFamily="49" charset="0"/>
+              </a:rPr>
+              <a:t> </a:t>
+            </a:r>
+            <a:r>
+              <a:rPr lang="en-US" b="0" dirty="0">
+                <a:solidFill>
+                  <a:srgbClr val="569CD6"/>
+                </a:solidFill>
+                <a:effectLst/>
+                <a:latin typeface="Consolas" panose="020B0609020204030204" pitchFamily="49" charset="0"/>
+              </a:rPr>
+              <a:t>static</a:t>
+            </a:r>
+            <a:r>
+              <a:rPr lang="en-US" b="0" dirty="0">
+                <a:solidFill>
+                  <a:srgbClr val="D4D4D4"/>
+                </a:solidFill>
+                <a:effectLst/>
+                <a:latin typeface="Consolas" panose="020B0609020204030204" pitchFamily="49" charset="0"/>
+              </a:rPr>
+              <a:t> </a:t>
+            </a:r>
+            <a:r>
+              <a:rPr lang="en-US" b="0" dirty="0">
+                <a:solidFill>
+                  <a:srgbClr val="4EC9B0"/>
+                </a:solidFill>
+                <a:effectLst/>
+                <a:latin typeface="Consolas" panose="020B0609020204030204" pitchFamily="49" charset="0"/>
+              </a:rPr>
+              <a:t>int</a:t>
+            </a:r>
+            <a:r>
+              <a:rPr lang="en-US" b="0" dirty="0">
+                <a:solidFill>
+                  <a:srgbClr val="D4D4D4"/>
+                </a:solidFill>
+                <a:effectLst/>
+                <a:latin typeface="Consolas" panose="020B0609020204030204" pitchFamily="49" charset="0"/>
+              </a:rPr>
+              <a:t> </a:t>
+            </a:r>
+            <a:r>
+              <a:rPr lang="en-US" b="0" dirty="0">
+                <a:solidFill>
+                  <a:srgbClr val="DCDCAA"/>
+                </a:solidFill>
+                <a:effectLst/>
+                <a:latin typeface="Consolas" panose="020B0609020204030204" pitchFamily="49" charset="0"/>
+              </a:rPr>
+              <a:t>sum</a:t>
+            </a:r>
+            <a:r>
+              <a:rPr lang="en-US" b="0" dirty="0">
+                <a:solidFill>
+                  <a:srgbClr val="D4D4D4"/>
+                </a:solidFill>
+                <a:effectLst/>
+                <a:latin typeface="Consolas" panose="020B0609020204030204" pitchFamily="49" charset="0"/>
+              </a:rPr>
+              <a:t>(</a:t>
+            </a:r>
+            <a:r>
+              <a:rPr lang="en-US" b="0" dirty="0">
+                <a:solidFill>
+                  <a:srgbClr val="4EC9B0"/>
+                </a:solidFill>
+                <a:effectLst/>
+                <a:latin typeface="Consolas" panose="020B0609020204030204" pitchFamily="49" charset="0"/>
+              </a:rPr>
+              <a:t>Object</a:t>
+            </a:r>
+            <a:r>
+              <a:rPr lang="en-US" b="0" dirty="0">
+                <a:solidFill>
+                  <a:srgbClr val="D4D4D4"/>
+                </a:solidFill>
+                <a:effectLst/>
+                <a:latin typeface="Consolas" panose="020B0609020204030204" pitchFamily="49" charset="0"/>
+              </a:rPr>
+              <a:t>[] </a:t>
+            </a:r>
+            <a:r>
+              <a:rPr lang="en-US" b="0" dirty="0">
+                <a:solidFill>
+                  <a:srgbClr val="9CDCFE"/>
+                </a:solidFill>
+                <a:effectLst/>
+                <a:latin typeface="Consolas" panose="020B0609020204030204" pitchFamily="49" charset="0"/>
+              </a:rPr>
+              <a:t>values</a:t>
+            </a:r>
+            <a:r>
+              <a:rPr lang="en-US" b="0" dirty="0">
+                <a:solidFill>
+                  <a:srgbClr val="D4D4D4"/>
+                </a:solidFill>
+                <a:effectLst/>
+                <a:latin typeface="Consolas" panose="020B0609020204030204" pitchFamily="49" charset="0"/>
+              </a:rPr>
+              <a:t>) {</a:t>
+            </a:r>
+          </a:p>
+          <a:p>
+            <a:r>
+              <a:rPr lang="en-US" b="0" dirty="0">
+                <a:solidFill>
+                  <a:srgbClr val="D4D4D4"/>
+                </a:solidFill>
+                <a:effectLst/>
+                <a:latin typeface="Consolas" panose="020B0609020204030204" pitchFamily="49" charset="0"/>
+              </a:rPr>
+              <a:t>        </a:t>
+            </a:r>
+            <a:r>
+              <a:rPr lang="en-US" b="0" dirty="0">
+                <a:solidFill>
+                  <a:srgbClr val="C586C0"/>
+                </a:solidFill>
+                <a:effectLst/>
+                <a:latin typeface="Consolas" panose="020B0609020204030204" pitchFamily="49" charset="0"/>
+              </a:rPr>
+              <a:t>return</a:t>
+            </a:r>
+            <a:r>
+              <a:rPr lang="en-US" b="0" dirty="0">
+                <a:solidFill>
+                  <a:srgbClr val="D4D4D4"/>
+                </a:solidFill>
+                <a:effectLst/>
+                <a:latin typeface="Consolas" panose="020B0609020204030204" pitchFamily="49" charset="0"/>
+              </a:rPr>
+              <a:t> </a:t>
+            </a:r>
+            <a:r>
+              <a:rPr lang="en-US" b="0" dirty="0">
+                <a:solidFill>
+                  <a:srgbClr val="DCDCAA"/>
+                </a:solidFill>
+                <a:effectLst/>
+                <a:latin typeface="Consolas" panose="020B0609020204030204" pitchFamily="49" charset="0"/>
+              </a:rPr>
+              <a:t>sum</a:t>
+            </a:r>
+            <a:r>
+              <a:rPr lang="en-US" b="0" dirty="0">
+                <a:solidFill>
+                  <a:srgbClr val="D4D4D4"/>
+                </a:solidFill>
+                <a:effectLst/>
+                <a:latin typeface="Consolas" panose="020B0609020204030204" pitchFamily="49" charset="0"/>
+              </a:rPr>
+              <a:t>(</a:t>
+            </a:r>
+            <a:r>
+              <a:rPr lang="en-US" b="0" dirty="0">
+                <a:solidFill>
+                  <a:srgbClr val="9CDCFE"/>
+                </a:solidFill>
+                <a:effectLst/>
+                <a:latin typeface="Consolas" panose="020B0609020204030204" pitchFamily="49" charset="0"/>
+              </a:rPr>
+              <a:t>values</a:t>
+            </a:r>
+            <a:r>
+              <a:rPr lang="en-US" b="0" dirty="0">
+                <a:solidFill>
+                  <a:srgbClr val="D4D4D4"/>
+                </a:solidFill>
+                <a:effectLst/>
+                <a:latin typeface="Consolas" panose="020B0609020204030204" pitchFamily="49" charset="0"/>
+              </a:rPr>
+              <a:t>, </a:t>
+            </a:r>
+            <a:r>
+              <a:rPr lang="en-US" b="0" dirty="0">
+                <a:solidFill>
+                  <a:srgbClr val="B5CEA8"/>
+                </a:solidFill>
+                <a:effectLst/>
+                <a:latin typeface="Consolas" panose="020B0609020204030204" pitchFamily="49" charset="0"/>
+              </a:rPr>
+              <a:t>0</a:t>
+            </a:r>
+            <a:r>
+              <a:rPr lang="en-US" b="0" dirty="0">
+                <a:solidFill>
+                  <a:srgbClr val="D4D4D4"/>
+                </a:solidFill>
+                <a:effectLst/>
+                <a:latin typeface="Consolas" panose="020B0609020204030204" pitchFamily="49" charset="0"/>
+              </a:rPr>
+              <a:t>); </a:t>
+            </a:r>
+            <a:r>
+              <a:rPr lang="en-US" b="0" dirty="0">
+                <a:solidFill>
+                  <a:srgbClr val="6A9955"/>
+                </a:solidFill>
+                <a:effectLst/>
+                <a:latin typeface="Consolas" panose="020B0609020204030204" pitchFamily="49" charset="0"/>
+              </a:rPr>
+              <a:t>// overload, for easier initial call</a:t>
+            </a:r>
+            <a:endParaRPr lang="en-US" b="0" dirty="0">
+              <a:solidFill>
+                <a:srgbClr val="D4D4D4"/>
+              </a:solidFill>
+              <a:effectLst/>
+              <a:latin typeface="Consolas" panose="020B0609020204030204" pitchFamily="49" charset="0"/>
+            </a:endParaRPr>
+          </a:p>
+          <a:p>
+            <a:r>
+              <a:rPr lang="en-US" b="0" dirty="0">
+                <a:solidFill>
+                  <a:srgbClr val="D4D4D4"/>
+                </a:solidFill>
+                <a:effectLst/>
+                <a:latin typeface="Consolas" panose="020B0609020204030204" pitchFamily="49" charset="0"/>
+              </a:rPr>
+              <a:t>    }</a:t>
+            </a:r>
+          </a:p>
+          <a:p>
+            <a:r>
+              <a:rPr lang="en-US" b="0" dirty="0">
+                <a:solidFill>
+                  <a:srgbClr val="D4D4D4"/>
+                </a:solidFill>
+                <a:effectLst/>
+                <a:latin typeface="Consolas" panose="020B0609020204030204" pitchFamily="49" charset="0"/>
+              </a:rPr>
+              <a:t>    </a:t>
+            </a:r>
+            <a:r>
+              <a:rPr lang="en-US" b="0" dirty="0">
+                <a:solidFill>
+                  <a:srgbClr val="569CD6"/>
+                </a:solidFill>
+                <a:effectLst/>
+                <a:latin typeface="Consolas" panose="020B0609020204030204" pitchFamily="49" charset="0"/>
+              </a:rPr>
+              <a:t>public</a:t>
+            </a:r>
+            <a:r>
+              <a:rPr lang="en-US" b="0" dirty="0">
+                <a:solidFill>
+                  <a:srgbClr val="D4D4D4"/>
+                </a:solidFill>
+                <a:effectLst/>
+                <a:latin typeface="Consolas" panose="020B0609020204030204" pitchFamily="49" charset="0"/>
+              </a:rPr>
+              <a:t> </a:t>
+            </a:r>
+            <a:r>
+              <a:rPr lang="en-US" b="0" dirty="0">
+                <a:solidFill>
+                  <a:srgbClr val="569CD6"/>
+                </a:solidFill>
+                <a:effectLst/>
+                <a:latin typeface="Consolas" panose="020B0609020204030204" pitchFamily="49" charset="0"/>
+              </a:rPr>
+              <a:t>static</a:t>
+            </a:r>
+            <a:r>
+              <a:rPr lang="en-US" b="0" dirty="0">
+                <a:solidFill>
+                  <a:srgbClr val="D4D4D4"/>
+                </a:solidFill>
+                <a:effectLst/>
+                <a:latin typeface="Consolas" panose="020B0609020204030204" pitchFamily="49" charset="0"/>
+              </a:rPr>
+              <a:t> </a:t>
+            </a:r>
+            <a:r>
+              <a:rPr lang="en-US" b="0" dirty="0">
+                <a:solidFill>
+                  <a:srgbClr val="4EC9B0"/>
+                </a:solidFill>
+                <a:effectLst/>
+                <a:latin typeface="Consolas" panose="020B0609020204030204" pitchFamily="49" charset="0"/>
+              </a:rPr>
+              <a:t>int</a:t>
+            </a:r>
+            <a:r>
+              <a:rPr lang="en-US" b="0" dirty="0">
+                <a:solidFill>
+                  <a:srgbClr val="D4D4D4"/>
+                </a:solidFill>
+                <a:effectLst/>
+                <a:latin typeface="Consolas" panose="020B0609020204030204" pitchFamily="49" charset="0"/>
+              </a:rPr>
+              <a:t> </a:t>
+            </a:r>
+            <a:r>
+              <a:rPr lang="en-US" b="0" dirty="0">
+                <a:solidFill>
+                  <a:srgbClr val="DCDCAA"/>
+                </a:solidFill>
+                <a:effectLst/>
+                <a:latin typeface="Consolas" panose="020B0609020204030204" pitchFamily="49" charset="0"/>
+              </a:rPr>
+              <a:t>sum</a:t>
+            </a:r>
+            <a:r>
+              <a:rPr lang="en-US" b="0" dirty="0">
+                <a:solidFill>
+                  <a:srgbClr val="D4D4D4"/>
+                </a:solidFill>
+                <a:effectLst/>
+                <a:latin typeface="Consolas" panose="020B0609020204030204" pitchFamily="49" charset="0"/>
+              </a:rPr>
+              <a:t>(</a:t>
+            </a:r>
+            <a:r>
+              <a:rPr lang="en-US" b="0" dirty="0">
+                <a:solidFill>
+                  <a:srgbClr val="4EC9B0"/>
+                </a:solidFill>
+                <a:effectLst/>
+                <a:latin typeface="Consolas" panose="020B0609020204030204" pitchFamily="49" charset="0"/>
+              </a:rPr>
+              <a:t>Object</a:t>
+            </a:r>
+            <a:r>
+              <a:rPr lang="en-US" b="0" dirty="0">
+                <a:solidFill>
+                  <a:srgbClr val="D4D4D4"/>
+                </a:solidFill>
+                <a:effectLst/>
+                <a:latin typeface="Consolas" panose="020B0609020204030204" pitchFamily="49" charset="0"/>
+              </a:rPr>
+              <a:t>[] </a:t>
+            </a:r>
+            <a:r>
+              <a:rPr lang="en-US" b="0" dirty="0">
+                <a:solidFill>
+                  <a:srgbClr val="9CDCFE"/>
+                </a:solidFill>
+                <a:effectLst/>
+                <a:latin typeface="Consolas" panose="020B0609020204030204" pitchFamily="49" charset="0"/>
+              </a:rPr>
+              <a:t>values</a:t>
+            </a:r>
+            <a:r>
+              <a:rPr lang="en-US" b="0" dirty="0">
+                <a:solidFill>
+                  <a:srgbClr val="D4D4D4"/>
+                </a:solidFill>
+                <a:effectLst/>
+                <a:latin typeface="Consolas" panose="020B0609020204030204" pitchFamily="49" charset="0"/>
+              </a:rPr>
+              <a:t>, </a:t>
+            </a:r>
+            <a:r>
+              <a:rPr lang="en-US" b="0" dirty="0">
+                <a:solidFill>
+                  <a:srgbClr val="4EC9B0"/>
+                </a:solidFill>
+                <a:effectLst/>
+                <a:latin typeface="Consolas" panose="020B0609020204030204" pitchFamily="49" charset="0"/>
+              </a:rPr>
+              <a:t>int</a:t>
+            </a:r>
+            <a:r>
+              <a:rPr lang="en-US" b="0" dirty="0">
+                <a:solidFill>
+                  <a:srgbClr val="D4D4D4"/>
+                </a:solidFill>
+                <a:effectLst/>
+                <a:latin typeface="Consolas" panose="020B0609020204030204" pitchFamily="49" charset="0"/>
+              </a:rPr>
+              <a:t> </a:t>
+            </a:r>
+            <a:r>
+              <a:rPr lang="en-US" b="0" dirty="0">
+                <a:solidFill>
+                  <a:srgbClr val="9CDCFE"/>
+                </a:solidFill>
+                <a:effectLst/>
+                <a:latin typeface="Consolas" panose="020B0609020204030204" pitchFamily="49" charset="0"/>
+              </a:rPr>
+              <a:t>current</a:t>
+            </a:r>
+            <a:r>
+              <a:rPr lang="en-US" b="0" dirty="0">
+                <a:solidFill>
+                  <a:srgbClr val="D4D4D4"/>
+                </a:solidFill>
+                <a:effectLst/>
+                <a:latin typeface="Consolas" panose="020B0609020204030204" pitchFamily="49" charset="0"/>
+              </a:rPr>
+              <a:t>) {</a:t>
+            </a:r>
+          </a:p>
+          <a:p>
+            <a:r>
+              <a:rPr lang="en-US" b="0" dirty="0">
+                <a:solidFill>
+                  <a:srgbClr val="D4D4D4"/>
+                </a:solidFill>
+                <a:effectLst/>
+                <a:latin typeface="Consolas" panose="020B0609020204030204" pitchFamily="49" charset="0"/>
+              </a:rPr>
+              <a:t>        </a:t>
+            </a:r>
+            <a:r>
+              <a:rPr lang="en-US" b="0" dirty="0">
+                <a:solidFill>
+                  <a:srgbClr val="C586C0"/>
+                </a:solidFill>
+                <a:effectLst/>
+                <a:latin typeface="Consolas" panose="020B0609020204030204" pitchFamily="49" charset="0"/>
+              </a:rPr>
+              <a:t>if</a:t>
+            </a:r>
+            <a:r>
+              <a:rPr lang="en-US" b="0" dirty="0">
+                <a:solidFill>
+                  <a:srgbClr val="D4D4D4"/>
+                </a:solidFill>
+                <a:effectLst/>
+                <a:latin typeface="Consolas" panose="020B0609020204030204" pitchFamily="49" charset="0"/>
+              </a:rPr>
+              <a:t>(</a:t>
+            </a:r>
+            <a:r>
+              <a:rPr lang="en-US" b="0" dirty="0">
+                <a:solidFill>
+                  <a:srgbClr val="9CDCFE"/>
+                </a:solidFill>
+                <a:effectLst/>
+                <a:latin typeface="Consolas" panose="020B0609020204030204" pitchFamily="49" charset="0"/>
+              </a:rPr>
+              <a:t>current</a:t>
+            </a:r>
+            <a:r>
+              <a:rPr lang="en-US" b="0" dirty="0">
+                <a:solidFill>
+                  <a:srgbClr val="D4D4D4"/>
+                </a:solidFill>
+                <a:effectLst/>
+                <a:latin typeface="Consolas" panose="020B0609020204030204" pitchFamily="49" charset="0"/>
+              </a:rPr>
+              <a:t> &gt;= </a:t>
+            </a:r>
+            <a:r>
+              <a:rPr lang="en-US" b="0" dirty="0" err="1">
+                <a:solidFill>
+                  <a:srgbClr val="9CDCFE"/>
+                </a:solidFill>
+                <a:effectLst/>
+                <a:latin typeface="Consolas" panose="020B0609020204030204" pitchFamily="49" charset="0"/>
+              </a:rPr>
+              <a:t>values</a:t>
+            </a:r>
+            <a:r>
+              <a:rPr lang="en-US" b="0" dirty="0" err="1">
+                <a:solidFill>
+                  <a:srgbClr val="D4D4D4"/>
+                </a:solidFill>
+                <a:effectLst/>
+                <a:latin typeface="Consolas" panose="020B0609020204030204" pitchFamily="49" charset="0"/>
+              </a:rPr>
+              <a:t>.</a:t>
+            </a:r>
+            <a:r>
+              <a:rPr lang="en-US" b="0" dirty="0" err="1">
+                <a:solidFill>
+                  <a:srgbClr val="4FC1FF"/>
+                </a:solidFill>
+                <a:effectLst/>
+                <a:latin typeface="Consolas" panose="020B0609020204030204" pitchFamily="49" charset="0"/>
+              </a:rPr>
+              <a:t>length</a:t>
+            </a:r>
+            <a:r>
+              <a:rPr lang="en-US" b="0" dirty="0">
+                <a:solidFill>
+                  <a:srgbClr val="D4D4D4"/>
+                </a:solidFill>
+                <a:effectLst/>
+                <a:latin typeface="Consolas" panose="020B0609020204030204" pitchFamily="49" charset="0"/>
+              </a:rPr>
+              <a:t>) </a:t>
+            </a:r>
+            <a:r>
+              <a:rPr lang="en-US" b="0" dirty="0">
+                <a:solidFill>
+                  <a:srgbClr val="C586C0"/>
+                </a:solidFill>
+                <a:effectLst/>
+                <a:latin typeface="Consolas" panose="020B0609020204030204" pitchFamily="49" charset="0"/>
+              </a:rPr>
+              <a:t>return</a:t>
+            </a:r>
+            <a:r>
+              <a:rPr lang="en-US" b="0" dirty="0">
+                <a:solidFill>
+                  <a:srgbClr val="D4D4D4"/>
+                </a:solidFill>
+                <a:effectLst/>
+                <a:latin typeface="Consolas" panose="020B0609020204030204" pitchFamily="49" charset="0"/>
+              </a:rPr>
+              <a:t> </a:t>
+            </a:r>
+            <a:r>
+              <a:rPr lang="en-US" b="0" dirty="0">
+                <a:solidFill>
+                  <a:srgbClr val="B5CEA8"/>
+                </a:solidFill>
+                <a:effectLst/>
+                <a:latin typeface="Consolas" panose="020B0609020204030204" pitchFamily="49" charset="0"/>
+              </a:rPr>
+              <a:t>0</a:t>
+            </a:r>
+            <a:r>
+              <a:rPr lang="en-US" b="0" dirty="0">
+                <a:solidFill>
+                  <a:srgbClr val="D4D4D4"/>
+                </a:solidFill>
+                <a:effectLst/>
+                <a:latin typeface="Consolas" panose="020B0609020204030204" pitchFamily="49" charset="0"/>
+              </a:rPr>
+              <a:t>; </a:t>
+            </a:r>
+            <a:r>
+              <a:rPr lang="en-US" b="0" dirty="0">
+                <a:solidFill>
+                  <a:srgbClr val="6A9955"/>
+                </a:solidFill>
+                <a:effectLst/>
+                <a:latin typeface="Consolas" panose="020B0609020204030204" pitchFamily="49" charset="0"/>
+              </a:rPr>
+              <a:t>// past end of array, return 0</a:t>
+            </a:r>
+            <a:endParaRPr lang="en-US" b="0" dirty="0">
+              <a:solidFill>
+                <a:srgbClr val="D4D4D4"/>
+              </a:solidFill>
+              <a:effectLst/>
+              <a:latin typeface="Consolas" panose="020B0609020204030204" pitchFamily="49" charset="0"/>
+            </a:endParaRPr>
+          </a:p>
+          <a:p>
+            <a:r>
+              <a:rPr lang="en-US" b="0" dirty="0">
+                <a:solidFill>
+                  <a:srgbClr val="D4D4D4"/>
+                </a:solidFill>
+                <a:effectLst/>
+                <a:latin typeface="Consolas" panose="020B0609020204030204" pitchFamily="49" charset="0"/>
+              </a:rPr>
+              <a:t>        </a:t>
+            </a:r>
+            <a:r>
+              <a:rPr lang="en-US" b="0" dirty="0">
+                <a:solidFill>
+                  <a:srgbClr val="C586C0"/>
+                </a:solidFill>
+                <a:effectLst/>
+                <a:latin typeface="Consolas" panose="020B0609020204030204" pitchFamily="49" charset="0"/>
+              </a:rPr>
+              <a:t>if</a:t>
+            </a:r>
+            <a:r>
+              <a:rPr lang="en-US" b="0" dirty="0">
+                <a:solidFill>
+                  <a:srgbClr val="D4D4D4"/>
+                </a:solidFill>
+                <a:effectLst/>
+                <a:latin typeface="Consolas" panose="020B0609020204030204" pitchFamily="49" charset="0"/>
+              </a:rPr>
+              <a:t>(</a:t>
+            </a:r>
+            <a:r>
+              <a:rPr lang="en-US" b="0" dirty="0">
+                <a:solidFill>
+                  <a:srgbClr val="9CDCFE"/>
+                </a:solidFill>
+                <a:effectLst/>
+                <a:latin typeface="Consolas" panose="020B0609020204030204" pitchFamily="49" charset="0"/>
+              </a:rPr>
+              <a:t>values</a:t>
+            </a:r>
+            <a:r>
+              <a:rPr lang="en-US" b="0" dirty="0">
+                <a:solidFill>
+                  <a:srgbClr val="D4D4D4"/>
+                </a:solidFill>
+                <a:effectLst/>
+                <a:latin typeface="Consolas" panose="020B0609020204030204" pitchFamily="49" charset="0"/>
+              </a:rPr>
+              <a:t>[</a:t>
+            </a:r>
+            <a:r>
+              <a:rPr lang="en-US" b="0" dirty="0">
+                <a:solidFill>
+                  <a:srgbClr val="9CDCFE"/>
+                </a:solidFill>
+                <a:effectLst/>
+                <a:latin typeface="Consolas" panose="020B0609020204030204" pitchFamily="49" charset="0"/>
+              </a:rPr>
+              <a:t>current</a:t>
+            </a:r>
+            <a:r>
+              <a:rPr lang="en-US" b="0" dirty="0">
+                <a:solidFill>
+                  <a:srgbClr val="D4D4D4"/>
+                </a:solidFill>
+                <a:effectLst/>
+                <a:latin typeface="Consolas" panose="020B0609020204030204" pitchFamily="49" charset="0"/>
+              </a:rPr>
+              <a:t>] </a:t>
+            </a:r>
+            <a:r>
+              <a:rPr lang="en-US" b="0" dirty="0" err="1">
+                <a:solidFill>
+                  <a:srgbClr val="569CD6"/>
+                </a:solidFill>
+                <a:effectLst/>
+                <a:latin typeface="Consolas" panose="020B0609020204030204" pitchFamily="49" charset="0"/>
+              </a:rPr>
+              <a:t>instanceof</a:t>
+            </a:r>
+            <a:r>
+              <a:rPr lang="en-US" b="0" dirty="0">
+                <a:solidFill>
+                  <a:srgbClr val="D4D4D4"/>
+                </a:solidFill>
+                <a:effectLst/>
+                <a:latin typeface="Consolas" panose="020B0609020204030204" pitchFamily="49" charset="0"/>
+              </a:rPr>
+              <a:t> </a:t>
+            </a:r>
+            <a:r>
+              <a:rPr lang="en-US" b="0" dirty="0">
+                <a:solidFill>
+                  <a:srgbClr val="4EC9B0"/>
+                </a:solidFill>
+                <a:effectLst/>
+                <a:latin typeface="Consolas" panose="020B0609020204030204" pitchFamily="49" charset="0"/>
+              </a:rPr>
+              <a:t>Object</a:t>
+            </a:r>
+            <a:r>
+              <a:rPr lang="en-US" b="0" dirty="0">
+                <a:solidFill>
+                  <a:srgbClr val="D4D4D4"/>
+                </a:solidFill>
+                <a:effectLst/>
+                <a:latin typeface="Consolas" panose="020B0609020204030204" pitchFamily="49" charset="0"/>
+              </a:rPr>
+              <a:t>[]) </a:t>
+            </a:r>
+            <a:r>
+              <a:rPr lang="en-US" b="0" dirty="0">
+                <a:solidFill>
+                  <a:srgbClr val="6A9955"/>
+                </a:solidFill>
+                <a:effectLst/>
+                <a:latin typeface="Consolas" panose="020B0609020204030204" pitchFamily="49" charset="0"/>
+              </a:rPr>
+              <a:t>// another array!</a:t>
+            </a:r>
+            <a:endParaRPr lang="en-US" b="0" dirty="0">
+              <a:solidFill>
+                <a:srgbClr val="D4D4D4"/>
+              </a:solidFill>
+              <a:effectLst/>
+              <a:latin typeface="Consolas" panose="020B0609020204030204" pitchFamily="49" charset="0"/>
+            </a:endParaRPr>
+          </a:p>
+          <a:p>
+            <a:r>
+              <a:rPr lang="en-US" b="0" dirty="0">
+                <a:solidFill>
+                  <a:srgbClr val="D4D4D4"/>
+                </a:solidFill>
+                <a:effectLst/>
+                <a:latin typeface="Consolas" panose="020B0609020204030204" pitchFamily="49" charset="0"/>
+              </a:rPr>
+              <a:t>            </a:t>
+            </a:r>
+            <a:r>
+              <a:rPr lang="en-US" b="0" dirty="0">
+                <a:solidFill>
+                  <a:srgbClr val="C586C0"/>
+                </a:solidFill>
+                <a:effectLst/>
+                <a:latin typeface="Consolas" panose="020B0609020204030204" pitchFamily="49" charset="0"/>
+              </a:rPr>
+              <a:t>return</a:t>
+            </a:r>
+            <a:r>
+              <a:rPr lang="en-US" b="0" dirty="0">
+                <a:solidFill>
+                  <a:srgbClr val="D4D4D4"/>
+                </a:solidFill>
+                <a:effectLst/>
+                <a:latin typeface="Consolas" panose="020B0609020204030204" pitchFamily="49" charset="0"/>
+              </a:rPr>
+              <a:t> </a:t>
+            </a:r>
+            <a:r>
+              <a:rPr lang="en-US" b="0" dirty="0">
+                <a:solidFill>
+                  <a:srgbClr val="DCDCAA"/>
+                </a:solidFill>
+                <a:effectLst/>
+                <a:latin typeface="Consolas" panose="020B0609020204030204" pitchFamily="49" charset="0"/>
+              </a:rPr>
+              <a:t>sum</a:t>
+            </a:r>
+            <a:r>
+              <a:rPr lang="en-US" b="0" dirty="0">
+                <a:solidFill>
+                  <a:srgbClr val="D4D4D4"/>
+                </a:solidFill>
+                <a:effectLst/>
+                <a:latin typeface="Consolas" panose="020B0609020204030204" pitchFamily="49" charset="0"/>
+              </a:rPr>
+              <a:t>((</a:t>
+            </a:r>
+            <a:r>
+              <a:rPr lang="en-US" b="0" dirty="0">
+                <a:solidFill>
+                  <a:srgbClr val="4EC9B0"/>
+                </a:solidFill>
+                <a:effectLst/>
+                <a:latin typeface="Consolas" panose="020B0609020204030204" pitchFamily="49" charset="0"/>
+              </a:rPr>
+              <a:t>Object</a:t>
+            </a:r>
+            <a:r>
+              <a:rPr lang="en-US" b="0" dirty="0">
+                <a:solidFill>
+                  <a:srgbClr val="D4D4D4"/>
+                </a:solidFill>
+                <a:effectLst/>
+                <a:latin typeface="Consolas" panose="020B0609020204030204" pitchFamily="49" charset="0"/>
+              </a:rPr>
+              <a:t>[])</a:t>
+            </a:r>
+            <a:r>
+              <a:rPr lang="en-US" b="0" dirty="0">
+                <a:solidFill>
+                  <a:srgbClr val="9CDCFE"/>
+                </a:solidFill>
+                <a:effectLst/>
+                <a:latin typeface="Consolas" panose="020B0609020204030204" pitchFamily="49" charset="0"/>
+              </a:rPr>
+              <a:t>values</a:t>
+            </a:r>
+            <a:r>
+              <a:rPr lang="en-US" b="0" dirty="0">
+                <a:solidFill>
+                  <a:srgbClr val="D4D4D4"/>
+                </a:solidFill>
+                <a:effectLst/>
+                <a:latin typeface="Consolas" panose="020B0609020204030204" pitchFamily="49" charset="0"/>
+              </a:rPr>
+              <a:t>[</a:t>
+            </a:r>
+            <a:r>
+              <a:rPr lang="en-US" b="0" dirty="0">
+                <a:solidFill>
+                  <a:srgbClr val="9CDCFE"/>
+                </a:solidFill>
+                <a:effectLst/>
+                <a:latin typeface="Consolas" panose="020B0609020204030204" pitchFamily="49" charset="0"/>
+              </a:rPr>
+              <a:t>current</a:t>
+            </a:r>
+            <a:r>
+              <a:rPr lang="en-US" b="0" dirty="0">
+                <a:solidFill>
+                  <a:srgbClr val="D4D4D4"/>
+                </a:solidFill>
+                <a:effectLst/>
+                <a:latin typeface="Consolas" panose="020B0609020204030204" pitchFamily="49" charset="0"/>
+              </a:rPr>
+              <a:t>], </a:t>
+            </a:r>
+            <a:r>
+              <a:rPr lang="en-US" b="0" dirty="0">
+                <a:solidFill>
+                  <a:srgbClr val="B5CEA8"/>
+                </a:solidFill>
+                <a:effectLst/>
+                <a:latin typeface="Consolas" panose="020B0609020204030204" pitchFamily="49" charset="0"/>
+              </a:rPr>
+              <a:t>0</a:t>
+            </a:r>
+            <a:r>
+              <a:rPr lang="en-US" b="0" dirty="0">
+                <a:solidFill>
+                  <a:srgbClr val="D4D4D4"/>
+                </a:solidFill>
+                <a:effectLst/>
+                <a:latin typeface="Consolas" panose="020B0609020204030204" pitchFamily="49" charset="0"/>
+              </a:rPr>
+              <a:t>) + </a:t>
+            </a:r>
+            <a:r>
+              <a:rPr lang="en-US" b="0" dirty="0">
+                <a:solidFill>
+                  <a:srgbClr val="DCDCAA"/>
+                </a:solidFill>
+                <a:effectLst/>
+                <a:latin typeface="Consolas" panose="020B0609020204030204" pitchFamily="49" charset="0"/>
+              </a:rPr>
+              <a:t>sum</a:t>
+            </a:r>
+            <a:r>
+              <a:rPr lang="en-US" b="0" dirty="0">
+                <a:solidFill>
+                  <a:srgbClr val="D4D4D4"/>
+                </a:solidFill>
+                <a:effectLst/>
+                <a:latin typeface="Consolas" panose="020B0609020204030204" pitchFamily="49" charset="0"/>
+              </a:rPr>
+              <a:t>(</a:t>
+            </a:r>
+            <a:r>
+              <a:rPr lang="en-US" b="0" dirty="0">
+                <a:solidFill>
+                  <a:srgbClr val="9CDCFE"/>
+                </a:solidFill>
+                <a:effectLst/>
+                <a:latin typeface="Consolas" panose="020B0609020204030204" pitchFamily="49" charset="0"/>
+              </a:rPr>
+              <a:t>values</a:t>
+            </a:r>
+            <a:r>
+              <a:rPr lang="en-US" b="0" dirty="0">
+                <a:solidFill>
+                  <a:srgbClr val="D4D4D4"/>
+                </a:solidFill>
+                <a:effectLst/>
+                <a:latin typeface="Consolas" panose="020B0609020204030204" pitchFamily="49" charset="0"/>
+              </a:rPr>
+              <a:t>, </a:t>
+            </a:r>
+            <a:r>
+              <a:rPr lang="en-US" b="0" dirty="0">
+                <a:solidFill>
+                  <a:srgbClr val="9CDCFE"/>
+                </a:solidFill>
+                <a:effectLst/>
+                <a:latin typeface="Consolas" panose="020B0609020204030204" pitchFamily="49" charset="0"/>
+              </a:rPr>
+              <a:t>current</a:t>
+            </a:r>
+            <a:r>
+              <a:rPr lang="en-US" b="0" dirty="0">
+                <a:solidFill>
+                  <a:srgbClr val="D4D4D4"/>
+                </a:solidFill>
+                <a:effectLst/>
+                <a:latin typeface="Consolas" panose="020B0609020204030204" pitchFamily="49" charset="0"/>
+              </a:rPr>
+              <a:t>+</a:t>
+            </a:r>
+            <a:r>
+              <a:rPr lang="en-US" b="0" dirty="0">
+                <a:solidFill>
+                  <a:srgbClr val="B5CEA8"/>
+                </a:solidFill>
+                <a:effectLst/>
+                <a:latin typeface="Consolas" panose="020B0609020204030204" pitchFamily="49" charset="0"/>
+              </a:rPr>
+              <a:t>1</a:t>
+            </a:r>
+            <a:r>
+              <a:rPr lang="en-US" b="0" dirty="0">
+                <a:solidFill>
+                  <a:srgbClr val="D4D4D4"/>
+                </a:solidFill>
+                <a:effectLst/>
+                <a:latin typeface="Consolas" panose="020B0609020204030204" pitchFamily="49" charset="0"/>
+              </a:rPr>
+              <a:t>);</a:t>
+            </a:r>
+          </a:p>
+          <a:p>
+            <a:r>
+              <a:rPr lang="en-US" b="0" dirty="0">
+                <a:solidFill>
+                  <a:srgbClr val="D4D4D4"/>
+                </a:solidFill>
+                <a:effectLst/>
+                <a:latin typeface="Consolas" panose="020B0609020204030204" pitchFamily="49" charset="0"/>
+              </a:rPr>
+              <a:t>        </a:t>
+            </a:r>
+            <a:r>
+              <a:rPr lang="en-US" b="0" dirty="0">
+                <a:solidFill>
+                  <a:srgbClr val="C586C0"/>
+                </a:solidFill>
+                <a:effectLst/>
+                <a:latin typeface="Consolas" panose="020B0609020204030204" pitchFamily="49" charset="0"/>
+              </a:rPr>
+              <a:t>return</a:t>
+            </a:r>
+            <a:r>
+              <a:rPr lang="en-US" b="0" dirty="0">
+                <a:solidFill>
+                  <a:srgbClr val="D4D4D4"/>
+                </a:solidFill>
+                <a:effectLst/>
+                <a:latin typeface="Consolas" panose="020B0609020204030204" pitchFamily="49" charset="0"/>
+              </a:rPr>
+              <a:t> (</a:t>
+            </a:r>
+            <a:r>
+              <a:rPr lang="en-US" b="0" dirty="0">
+                <a:solidFill>
+                  <a:srgbClr val="4EC9B0"/>
+                </a:solidFill>
+                <a:effectLst/>
+                <a:latin typeface="Consolas" panose="020B0609020204030204" pitchFamily="49" charset="0"/>
+              </a:rPr>
+              <a:t>Integer</a:t>
+            </a:r>
+            <a:r>
+              <a:rPr lang="en-US" b="0" dirty="0">
+                <a:solidFill>
+                  <a:srgbClr val="D4D4D4"/>
+                </a:solidFill>
+                <a:effectLst/>
+                <a:latin typeface="Consolas" panose="020B0609020204030204" pitchFamily="49" charset="0"/>
+              </a:rPr>
+              <a:t>)</a:t>
+            </a:r>
+            <a:r>
+              <a:rPr lang="en-US" b="0" dirty="0">
+                <a:solidFill>
+                  <a:srgbClr val="9CDCFE"/>
+                </a:solidFill>
+                <a:effectLst/>
+                <a:latin typeface="Consolas" panose="020B0609020204030204" pitchFamily="49" charset="0"/>
+              </a:rPr>
+              <a:t>values</a:t>
+            </a:r>
+            <a:r>
+              <a:rPr lang="en-US" b="0" dirty="0">
+                <a:solidFill>
+                  <a:srgbClr val="D4D4D4"/>
+                </a:solidFill>
+                <a:effectLst/>
+                <a:latin typeface="Consolas" panose="020B0609020204030204" pitchFamily="49" charset="0"/>
+              </a:rPr>
+              <a:t>[</a:t>
+            </a:r>
+            <a:r>
+              <a:rPr lang="en-US" b="0" dirty="0">
+                <a:solidFill>
+                  <a:srgbClr val="9CDCFE"/>
+                </a:solidFill>
+                <a:effectLst/>
+                <a:latin typeface="Consolas" panose="020B0609020204030204" pitchFamily="49" charset="0"/>
+              </a:rPr>
+              <a:t>current</a:t>
+            </a:r>
+            <a:r>
+              <a:rPr lang="en-US" b="0" dirty="0">
+                <a:solidFill>
+                  <a:srgbClr val="D4D4D4"/>
+                </a:solidFill>
+                <a:effectLst/>
+                <a:latin typeface="Consolas" panose="020B0609020204030204" pitchFamily="49" charset="0"/>
+              </a:rPr>
+              <a:t>] + </a:t>
+            </a:r>
+            <a:r>
+              <a:rPr lang="en-US" b="0" dirty="0">
+                <a:solidFill>
+                  <a:srgbClr val="DCDCAA"/>
+                </a:solidFill>
+                <a:effectLst/>
+                <a:latin typeface="Consolas" panose="020B0609020204030204" pitchFamily="49" charset="0"/>
+              </a:rPr>
+              <a:t>sum</a:t>
+            </a:r>
+            <a:r>
+              <a:rPr lang="en-US" b="0" dirty="0">
+                <a:solidFill>
+                  <a:srgbClr val="D4D4D4"/>
+                </a:solidFill>
+                <a:effectLst/>
+                <a:latin typeface="Consolas" panose="020B0609020204030204" pitchFamily="49" charset="0"/>
+              </a:rPr>
+              <a:t>(</a:t>
+            </a:r>
+            <a:r>
+              <a:rPr lang="en-US" b="0" dirty="0">
+                <a:solidFill>
+                  <a:srgbClr val="9CDCFE"/>
+                </a:solidFill>
+                <a:effectLst/>
+                <a:latin typeface="Consolas" panose="020B0609020204030204" pitchFamily="49" charset="0"/>
+              </a:rPr>
+              <a:t>values</a:t>
+            </a:r>
+            <a:r>
+              <a:rPr lang="en-US" b="0" dirty="0">
+                <a:solidFill>
+                  <a:srgbClr val="D4D4D4"/>
+                </a:solidFill>
+                <a:effectLst/>
+                <a:latin typeface="Consolas" panose="020B0609020204030204" pitchFamily="49" charset="0"/>
+              </a:rPr>
+              <a:t>, </a:t>
+            </a:r>
+            <a:r>
+              <a:rPr lang="en-US" b="0" dirty="0">
+                <a:solidFill>
+                  <a:srgbClr val="9CDCFE"/>
+                </a:solidFill>
+                <a:effectLst/>
+                <a:latin typeface="Consolas" panose="020B0609020204030204" pitchFamily="49" charset="0"/>
+              </a:rPr>
+              <a:t>current</a:t>
+            </a:r>
+            <a:r>
+              <a:rPr lang="en-US" b="0" dirty="0">
+                <a:solidFill>
+                  <a:srgbClr val="D4D4D4"/>
+                </a:solidFill>
+                <a:effectLst/>
+                <a:latin typeface="Consolas" panose="020B0609020204030204" pitchFamily="49" charset="0"/>
+              </a:rPr>
+              <a:t>+</a:t>
+            </a:r>
+            <a:r>
+              <a:rPr lang="en-US" b="0" dirty="0">
+                <a:solidFill>
+                  <a:srgbClr val="B5CEA8"/>
+                </a:solidFill>
+                <a:effectLst/>
+                <a:latin typeface="Consolas" panose="020B0609020204030204" pitchFamily="49" charset="0"/>
+              </a:rPr>
+              <a:t>1</a:t>
+            </a:r>
+            <a:r>
+              <a:rPr lang="en-US" b="0" dirty="0">
+                <a:solidFill>
+                  <a:srgbClr val="D4D4D4"/>
+                </a:solidFill>
+                <a:effectLst/>
+                <a:latin typeface="Consolas" panose="020B0609020204030204" pitchFamily="49" charset="0"/>
+              </a:rPr>
+              <a:t>); </a:t>
+            </a:r>
+            <a:r>
+              <a:rPr lang="en-US" b="0" dirty="0">
+                <a:solidFill>
+                  <a:srgbClr val="6A9955"/>
+                </a:solidFill>
+                <a:effectLst/>
+                <a:latin typeface="Consolas" panose="020B0609020204030204" pitchFamily="49" charset="0"/>
+              </a:rPr>
+              <a:t>// number plus something</a:t>
+            </a:r>
+            <a:endParaRPr lang="en-US" b="0" dirty="0">
+              <a:solidFill>
+                <a:srgbClr val="D4D4D4"/>
+              </a:solidFill>
+              <a:effectLst/>
+              <a:latin typeface="Consolas" panose="020B0609020204030204" pitchFamily="49" charset="0"/>
+            </a:endParaRPr>
+          </a:p>
+          <a:p>
+            <a:r>
+              <a:rPr lang="en-US" b="0" dirty="0">
+                <a:solidFill>
+                  <a:srgbClr val="D4D4D4"/>
+                </a:solidFill>
+                <a:effectLst/>
+                <a:latin typeface="Consolas" panose="020B0609020204030204" pitchFamily="49" charset="0"/>
+              </a:rPr>
+              <a:t>    }</a:t>
+            </a:r>
+          </a:p>
+          <a:p>
+            <a:r>
+              <a:rPr lang="en-US" b="0" dirty="0">
+                <a:solidFill>
+                  <a:srgbClr val="D4D4D4"/>
+                </a:solidFill>
+                <a:effectLst/>
+                <a:latin typeface="Consolas" panose="020B0609020204030204" pitchFamily="49" charset="0"/>
+              </a:rPr>
+              <a:t>    </a:t>
+            </a:r>
+            <a:r>
+              <a:rPr lang="en-US" b="0" dirty="0">
+                <a:solidFill>
+                  <a:srgbClr val="569CD6"/>
+                </a:solidFill>
+                <a:effectLst/>
+                <a:latin typeface="Consolas" panose="020B0609020204030204" pitchFamily="49" charset="0"/>
+              </a:rPr>
+              <a:t>public</a:t>
+            </a:r>
+            <a:r>
+              <a:rPr lang="en-US" b="0" dirty="0">
+                <a:solidFill>
+                  <a:srgbClr val="D4D4D4"/>
+                </a:solidFill>
+                <a:effectLst/>
+                <a:latin typeface="Consolas" panose="020B0609020204030204" pitchFamily="49" charset="0"/>
+              </a:rPr>
+              <a:t> </a:t>
+            </a:r>
+            <a:r>
+              <a:rPr lang="en-US" b="0" dirty="0">
+                <a:solidFill>
+                  <a:srgbClr val="569CD6"/>
+                </a:solidFill>
+                <a:effectLst/>
+                <a:latin typeface="Consolas" panose="020B0609020204030204" pitchFamily="49" charset="0"/>
+              </a:rPr>
+              <a:t>static</a:t>
+            </a:r>
+            <a:r>
+              <a:rPr lang="en-US" b="0" dirty="0">
+                <a:solidFill>
+                  <a:srgbClr val="D4D4D4"/>
+                </a:solidFill>
+                <a:effectLst/>
+                <a:latin typeface="Consolas" panose="020B0609020204030204" pitchFamily="49" charset="0"/>
+              </a:rPr>
+              <a:t> </a:t>
+            </a:r>
+            <a:r>
+              <a:rPr lang="en-US" b="0" dirty="0">
+                <a:solidFill>
+                  <a:srgbClr val="4EC9B0"/>
+                </a:solidFill>
+                <a:effectLst/>
+                <a:latin typeface="Consolas" panose="020B0609020204030204" pitchFamily="49" charset="0"/>
+              </a:rPr>
+              <a:t>void</a:t>
+            </a:r>
+            <a:r>
+              <a:rPr lang="en-US" b="0" dirty="0">
+                <a:solidFill>
+                  <a:srgbClr val="D4D4D4"/>
+                </a:solidFill>
+                <a:effectLst/>
+                <a:latin typeface="Consolas" panose="020B0609020204030204" pitchFamily="49" charset="0"/>
+              </a:rPr>
+              <a:t> </a:t>
+            </a:r>
+            <a:r>
+              <a:rPr lang="en-US" b="0" dirty="0">
+                <a:solidFill>
+                  <a:srgbClr val="DCDCAA"/>
+                </a:solidFill>
+                <a:effectLst/>
+                <a:latin typeface="Consolas" panose="020B0609020204030204" pitchFamily="49" charset="0"/>
+              </a:rPr>
+              <a:t>main</a:t>
+            </a:r>
+            <a:r>
+              <a:rPr lang="en-US" b="0" dirty="0">
+                <a:solidFill>
+                  <a:srgbClr val="D4D4D4"/>
+                </a:solidFill>
+                <a:effectLst/>
+                <a:latin typeface="Consolas" panose="020B0609020204030204" pitchFamily="49" charset="0"/>
+              </a:rPr>
+              <a:t>(</a:t>
+            </a:r>
+            <a:r>
+              <a:rPr lang="en-US" b="0" dirty="0">
+                <a:solidFill>
+                  <a:srgbClr val="4EC9B0"/>
+                </a:solidFill>
+                <a:effectLst/>
+                <a:latin typeface="Consolas" panose="020B0609020204030204" pitchFamily="49" charset="0"/>
+              </a:rPr>
+              <a:t>String</a:t>
+            </a:r>
+            <a:r>
+              <a:rPr lang="en-US" b="0" dirty="0">
+                <a:solidFill>
+                  <a:srgbClr val="D4D4D4"/>
+                </a:solidFill>
+                <a:effectLst/>
+                <a:latin typeface="Consolas" panose="020B0609020204030204" pitchFamily="49" charset="0"/>
+              </a:rPr>
+              <a:t>[] </a:t>
+            </a:r>
+            <a:r>
+              <a:rPr lang="en-US" b="0" dirty="0" err="1">
+                <a:solidFill>
+                  <a:srgbClr val="9CDCFE"/>
+                </a:solidFill>
+                <a:effectLst/>
+                <a:latin typeface="Consolas" panose="020B0609020204030204" pitchFamily="49" charset="0"/>
+              </a:rPr>
+              <a:t>args</a:t>
+            </a:r>
+            <a:r>
+              <a:rPr lang="en-US" b="0" dirty="0">
+                <a:solidFill>
+                  <a:srgbClr val="D4D4D4"/>
+                </a:solidFill>
+                <a:effectLst/>
+                <a:latin typeface="Consolas" panose="020B0609020204030204" pitchFamily="49" charset="0"/>
+              </a:rPr>
+              <a:t>) {</a:t>
+            </a:r>
+          </a:p>
+          <a:p>
+            <a:r>
+              <a:rPr lang="en-US" b="0" dirty="0">
+                <a:solidFill>
+                  <a:srgbClr val="D4D4D4"/>
+                </a:solidFill>
+                <a:effectLst/>
+                <a:latin typeface="Consolas" panose="020B0609020204030204" pitchFamily="49" charset="0"/>
+              </a:rPr>
+              <a:t>        </a:t>
+            </a:r>
+            <a:r>
+              <a:rPr lang="en-US" b="0" dirty="0">
+                <a:solidFill>
+                  <a:srgbClr val="4EC9B0"/>
+                </a:solidFill>
+                <a:effectLst/>
+                <a:latin typeface="Consolas" panose="020B0609020204030204" pitchFamily="49" charset="0"/>
+              </a:rPr>
+              <a:t>Object</a:t>
+            </a:r>
+            <a:r>
+              <a:rPr lang="en-US" b="0" dirty="0">
+                <a:solidFill>
+                  <a:srgbClr val="D4D4D4"/>
+                </a:solidFill>
+                <a:effectLst/>
+                <a:latin typeface="Consolas" panose="020B0609020204030204" pitchFamily="49" charset="0"/>
+              </a:rPr>
+              <a:t>[] </a:t>
+            </a:r>
+            <a:r>
+              <a:rPr lang="en-US" b="0" dirty="0">
+                <a:solidFill>
+                  <a:srgbClr val="9CDCFE"/>
+                </a:solidFill>
+                <a:effectLst/>
+                <a:latin typeface="Consolas" panose="020B0609020204030204" pitchFamily="49" charset="0"/>
+              </a:rPr>
+              <a:t>values</a:t>
+            </a:r>
+            <a:r>
+              <a:rPr lang="en-US" b="0" dirty="0">
+                <a:solidFill>
+                  <a:srgbClr val="D4D4D4"/>
+                </a:solidFill>
+                <a:effectLst/>
+                <a:latin typeface="Consolas" panose="020B0609020204030204" pitchFamily="49" charset="0"/>
+              </a:rPr>
+              <a:t> = </a:t>
+            </a:r>
+            <a:r>
+              <a:rPr lang="en-US" b="0" dirty="0">
+                <a:solidFill>
+                  <a:srgbClr val="C586C0"/>
+                </a:solidFill>
+                <a:effectLst/>
+                <a:latin typeface="Consolas" panose="020B0609020204030204" pitchFamily="49" charset="0"/>
+              </a:rPr>
+              <a:t>new</a:t>
+            </a:r>
+            <a:r>
+              <a:rPr lang="en-US" b="0" dirty="0">
+                <a:solidFill>
+                  <a:srgbClr val="D4D4D4"/>
+                </a:solidFill>
+                <a:effectLst/>
+                <a:latin typeface="Consolas" panose="020B0609020204030204" pitchFamily="49" charset="0"/>
+              </a:rPr>
+              <a:t> </a:t>
+            </a:r>
+            <a:r>
+              <a:rPr lang="en-US" b="0" dirty="0">
+                <a:solidFill>
+                  <a:srgbClr val="4EC9B0"/>
+                </a:solidFill>
+                <a:effectLst/>
+                <a:latin typeface="Consolas" panose="020B0609020204030204" pitchFamily="49" charset="0"/>
+              </a:rPr>
+              <a:t>Object</a:t>
+            </a:r>
+            <a:r>
+              <a:rPr lang="en-US" b="0" dirty="0">
+                <a:solidFill>
+                  <a:srgbClr val="D4D4D4"/>
+                </a:solidFill>
+                <a:effectLst/>
+                <a:latin typeface="Consolas" panose="020B0609020204030204" pitchFamily="49" charset="0"/>
+              </a:rPr>
+              <a:t>[]{</a:t>
+            </a:r>
+            <a:r>
+              <a:rPr lang="en-US" b="0" dirty="0">
+                <a:solidFill>
+                  <a:srgbClr val="B5CEA8"/>
+                </a:solidFill>
+                <a:effectLst/>
+                <a:latin typeface="Consolas" panose="020B0609020204030204" pitchFamily="49" charset="0"/>
+              </a:rPr>
+              <a:t>1</a:t>
+            </a:r>
+            <a:r>
+              <a:rPr lang="en-US" b="0" dirty="0">
+                <a:solidFill>
+                  <a:srgbClr val="D4D4D4"/>
+                </a:solidFill>
+                <a:effectLst/>
+                <a:latin typeface="Consolas" panose="020B0609020204030204" pitchFamily="49" charset="0"/>
+              </a:rPr>
+              <a:t>, </a:t>
+            </a:r>
+            <a:r>
+              <a:rPr lang="en-US" b="0" dirty="0">
+                <a:solidFill>
+                  <a:srgbClr val="B5CEA8"/>
+                </a:solidFill>
+                <a:effectLst/>
+                <a:latin typeface="Consolas" panose="020B0609020204030204" pitchFamily="49" charset="0"/>
+              </a:rPr>
+              <a:t>2</a:t>
+            </a:r>
+            <a:r>
+              <a:rPr lang="en-US" b="0" dirty="0">
+                <a:solidFill>
+                  <a:srgbClr val="D4D4D4"/>
+                </a:solidFill>
+                <a:effectLst/>
+                <a:latin typeface="Consolas" panose="020B0609020204030204" pitchFamily="49" charset="0"/>
+              </a:rPr>
+              <a:t>, </a:t>
+            </a:r>
+            <a:r>
+              <a:rPr lang="en-US" b="0" dirty="0">
+                <a:solidFill>
+                  <a:srgbClr val="B5CEA8"/>
+                </a:solidFill>
+                <a:effectLst/>
+                <a:latin typeface="Consolas" panose="020B0609020204030204" pitchFamily="49" charset="0"/>
+              </a:rPr>
+              <a:t>3</a:t>
+            </a:r>
+            <a:r>
+              <a:rPr lang="en-US" b="0" dirty="0">
+                <a:solidFill>
+                  <a:srgbClr val="D4D4D4"/>
+                </a:solidFill>
+                <a:effectLst/>
+                <a:latin typeface="Consolas" panose="020B0609020204030204" pitchFamily="49" charset="0"/>
+              </a:rPr>
+              <a:t>, </a:t>
+            </a:r>
+          </a:p>
+          <a:p>
+            <a:r>
+              <a:rPr lang="en-US" b="0" dirty="0">
+                <a:solidFill>
+                  <a:srgbClr val="D4D4D4"/>
+                </a:solidFill>
+                <a:effectLst/>
+                <a:latin typeface="Consolas" panose="020B0609020204030204" pitchFamily="49" charset="0"/>
+              </a:rPr>
+              <a:t>            </a:t>
+            </a:r>
+            <a:r>
+              <a:rPr lang="en-US" b="0" dirty="0">
+                <a:solidFill>
+                  <a:srgbClr val="C586C0"/>
+                </a:solidFill>
+                <a:effectLst/>
+                <a:latin typeface="Consolas" panose="020B0609020204030204" pitchFamily="49" charset="0"/>
+              </a:rPr>
+              <a:t>new</a:t>
+            </a:r>
+            <a:r>
+              <a:rPr lang="en-US" b="0" dirty="0">
+                <a:solidFill>
+                  <a:srgbClr val="D4D4D4"/>
+                </a:solidFill>
+                <a:effectLst/>
+                <a:latin typeface="Consolas" panose="020B0609020204030204" pitchFamily="49" charset="0"/>
+              </a:rPr>
+              <a:t> </a:t>
+            </a:r>
+            <a:r>
+              <a:rPr lang="en-US" b="0" dirty="0">
+                <a:solidFill>
+                  <a:srgbClr val="4EC9B0"/>
+                </a:solidFill>
+                <a:effectLst/>
+                <a:latin typeface="Consolas" panose="020B0609020204030204" pitchFamily="49" charset="0"/>
+              </a:rPr>
+              <a:t>Object</a:t>
+            </a:r>
+            <a:r>
+              <a:rPr lang="en-US" b="0" dirty="0">
+                <a:solidFill>
+                  <a:srgbClr val="D4D4D4"/>
+                </a:solidFill>
+                <a:effectLst/>
+                <a:latin typeface="Consolas" panose="020B0609020204030204" pitchFamily="49" charset="0"/>
+              </a:rPr>
+              <a:t>[]{</a:t>
+            </a:r>
+            <a:r>
+              <a:rPr lang="en-US" b="0" dirty="0">
+                <a:solidFill>
+                  <a:srgbClr val="B5CEA8"/>
+                </a:solidFill>
+                <a:effectLst/>
+                <a:latin typeface="Consolas" panose="020B0609020204030204" pitchFamily="49" charset="0"/>
+              </a:rPr>
+              <a:t>4</a:t>
+            </a:r>
+            <a:r>
+              <a:rPr lang="en-US" b="0" dirty="0">
+                <a:solidFill>
+                  <a:srgbClr val="D4D4D4"/>
+                </a:solidFill>
+                <a:effectLst/>
+                <a:latin typeface="Consolas" panose="020B0609020204030204" pitchFamily="49" charset="0"/>
+              </a:rPr>
+              <a:t>, </a:t>
+            </a:r>
+            <a:r>
+              <a:rPr lang="en-US" b="0" dirty="0">
+                <a:solidFill>
+                  <a:srgbClr val="B5CEA8"/>
+                </a:solidFill>
+                <a:effectLst/>
+                <a:latin typeface="Consolas" panose="020B0609020204030204" pitchFamily="49" charset="0"/>
+              </a:rPr>
+              <a:t>5</a:t>
+            </a:r>
+            <a:r>
+              <a:rPr lang="en-US" b="0" dirty="0">
+                <a:solidFill>
+                  <a:srgbClr val="D4D4D4"/>
+                </a:solidFill>
+                <a:effectLst/>
+                <a:latin typeface="Consolas" panose="020B0609020204030204" pitchFamily="49" charset="0"/>
+              </a:rPr>
+              <a:t>, </a:t>
+            </a:r>
+            <a:r>
+              <a:rPr lang="en-US" b="0" dirty="0">
+                <a:solidFill>
+                  <a:srgbClr val="C586C0"/>
+                </a:solidFill>
+                <a:effectLst/>
+                <a:latin typeface="Consolas" panose="020B0609020204030204" pitchFamily="49" charset="0"/>
+              </a:rPr>
+              <a:t>new</a:t>
+            </a:r>
+            <a:r>
+              <a:rPr lang="en-US" b="0" dirty="0">
+                <a:solidFill>
+                  <a:srgbClr val="D4D4D4"/>
+                </a:solidFill>
+                <a:effectLst/>
+                <a:latin typeface="Consolas" panose="020B0609020204030204" pitchFamily="49" charset="0"/>
+              </a:rPr>
+              <a:t> </a:t>
+            </a:r>
+            <a:r>
+              <a:rPr lang="en-US" b="0" dirty="0">
+                <a:solidFill>
+                  <a:srgbClr val="4EC9B0"/>
+                </a:solidFill>
+                <a:effectLst/>
+                <a:latin typeface="Consolas" panose="020B0609020204030204" pitchFamily="49" charset="0"/>
+              </a:rPr>
+              <a:t>Object</a:t>
+            </a:r>
+            <a:r>
+              <a:rPr lang="en-US" b="0" dirty="0">
+                <a:solidFill>
+                  <a:srgbClr val="D4D4D4"/>
+                </a:solidFill>
+                <a:effectLst/>
+                <a:latin typeface="Consolas" panose="020B0609020204030204" pitchFamily="49" charset="0"/>
+              </a:rPr>
+              <a:t>[]{</a:t>
+            </a:r>
+            <a:r>
+              <a:rPr lang="en-US" b="0" dirty="0">
+                <a:solidFill>
+                  <a:srgbClr val="B5CEA8"/>
+                </a:solidFill>
+                <a:effectLst/>
+                <a:latin typeface="Consolas" panose="020B0609020204030204" pitchFamily="49" charset="0"/>
+              </a:rPr>
+              <a:t>1</a:t>
+            </a:r>
+            <a:r>
+              <a:rPr lang="en-US" b="0" dirty="0">
+                <a:solidFill>
+                  <a:srgbClr val="D4D4D4"/>
+                </a:solidFill>
+                <a:effectLst/>
+                <a:latin typeface="Consolas" panose="020B0609020204030204" pitchFamily="49" charset="0"/>
+              </a:rPr>
+              <a:t>,</a:t>
+            </a:r>
+            <a:r>
+              <a:rPr lang="en-US" b="0" dirty="0">
+                <a:solidFill>
+                  <a:srgbClr val="B5CEA8"/>
+                </a:solidFill>
+                <a:effectLst/>
+                <a:latin typeface="Consolas" panose="020B0609020204030204" pitchFamily="49" charset="0"/>
+              </a:rPr>
+              <a:t>1</a:t>
+            </a:r>
+            <a:r>
+              <a:rPr lang="en-US" b="0" dirty="0">
+                <a:solidFill>
+                  <a:srgbClr val="D4D4D4"/>
+                </a:solidFill>
+                <a:effectLst/>
+                <a:latin typeface="Consolas" panose="020B0609020204030204" pitchFamily="49" charset="0"/>
+              </a:rPr>
+              <a:t>}},</a:t>
+            </a:r>
+          </a:p>
+          <a:p>
+            <a:r>
+              <a:rPr lang="en-US" b="0" dirty="0">
+                <a:solidFill>
+                  <a:srgbClr val="D4D4D4"/>
+                </a:solidFill>
+                <a:effectLst/>
+                <a:latin typeface="Consolas" panose="020B0609020204030204" pitchFamily="49" charset="0"/>
+              </a:rPr>
+              <a:t>            </a:t>
+            </a:r>
+            <a:r>
+              <a:rPr lang="en-US" b="0" dirty="0">
+                <a:solidFill>
+                  <a:srgbClr val="B5CEA8"/>
+                </a:solidFill>
+                <a:effectLst/>
+                <a:latin typeface="Consolas" panose="020B0609020204030204" pitchFamily="49" charset="0"/>
+              </a:rPr>
+              <a:t>10</a:t>
+            </a:r>
+            <a:r>
+              <a:rPr lang="en-US" b="0" dirty="0">
+                <a:solidFill>
+                  <a:srgbClr val="D4D4D4"/>
+                </a:solidFill>
+                <a:effectLst/>
+                <a:latin typeface="Consolas" panose="020B0609020204030204" pitchFamily="49" charset="0"/>
+              </a:rPr>
+              <a:t>, </a:t>
+            </a:r>
+            <a:r>
+              <a:rPr lang="en-US" b="0" dirty="0">
+                <a:solidFill>
+                  <a:srgbClr val="C586C0"/>
+                </a:solidFill>
+                <a:effectLst/>
+                <a:latin typeface="Consolas" panose="020B0609020204030204" pitchFamily="49" charset="0"/>
+              </a:rPr>
+              <a:t>new</a:t>
+            </a:r>
+            <a:r>
+              <a:rPr lang="en-US" b="0" dirty="0">
+                <a:solidFill>
+                  <a:srgbClr val="D4D4D4"/>
+                </a:solidFill>
+                <a:effectLst/>
+                <a:latin typeface="Consolas" panose="020B0609020204030204" pitchFamily="49" charset="0"/>
+              </a:rPr>
+              <a:t> </a:t>
+            </a:r>
+            <a:r>
+              <a:rPr lang="en-US" b="0" dirty="0">
+                <a:solidFill>
+                  <a:srgbClr val="4EC9B0"/>
+                </a:solidFill>
+                <a:effectLst/>
+                <a:latin typeface="Consolas" panose="020B0609020204030204" pitchFamily="49" charset="0"/>
+              </a:rPr>
+              <a:t>Integer</a:t>
+            </a:r>
+            <a:r>
+              <a:rPr lang="en-US" b="0" dirty="0">
+                <a:solidFill>
+                  <a:srgbClr val="D4D4D4"/>
+                </a:solidFill>
+                <a:effectLst/>
+                <a:latin typeface="Consolas" panose="020B0609020204030204" pitchFamily="49" charset="0"/>
+              </a:rPr>
+              <a:t>[]{</a:t>
+            </a:r>
+            <a:r>
+              <a:rPr lang="en-US" b="0" dirty="0">
+                <a:solidFill>
+                  <a:srgbClr val="B5CEA8"/>
+                </a:solidFill>
+                <a:effectLst/>
+                <a:latin typeface="Consolas" panose="020B0609020204030204" pitchFamily="49" charset="0"/>
+              </a:rPr>
+              <a:t>2</a:t>
+            </a:r>
+            <a:r>
+              <a:rPr lang="en-US" b="0" dirty="0">
+                <a:solidFill>
+                  <a:srgbClr val="D4D4D4"/>
+                </a:solidFill>
+                <a:effectLst/>
+                <a:latin typeface="Consolas" panose="020B0609020204030204" pitchFamily="49" charset="0"/>
+              </a:rPr>
+              <a:t>,</a:t>
+            </a:r>
+            <a:r>
+              <a:rPr lang="en-US" b="0" dirty="0">
+                <a:solidFill>
+                  <a:srgbClr val="B5CEA8"/>
+                </a:solidFill>
+                <a:effectLst/>
+                <a:latin typeface="Consolas" panose="020B0609020204030204" pitchFamily="49" charset="0"/>
+              </a:rPr>
+              <a:t>2</a:t>
+            </a:r>
+            <a:r>
+              <a:rPr lang="en-US" b="0" dirty="0">
+                <a:solidFill>
+                  <a:srgbClr val="D4D4D4"/>
+                </a:solidFill>
+                <a:effectLst/>
+                <a:latin typeface="Consolas" panose="020B0609020204030204" pitchFamily="49" charset="0"/>
+              </a:rPr>
+              <a:t>}, </a:t>
+            </a:r>
+            <a:r>
+              <a:rPr lang="en-US" b="0" dirty="0">
+                <a:solidFill>
+                  <a:srgbClr val="B5CEA8"/>
+                </a:solidFill>
+                <a:effectLst/>
+                <a:latin typeface="Consolas" panose="020B0609020204030204" pitchFamily="49" charset="0"/>
+              </a:rPr>
+              <a:t>1</a:t>
+            </a:r>
+            <a:r>
+              <a:rPr lang="en-US" b="0" dirty="0">
+                <a:solidFill>
+                  <a:srgbClr val="D4D4D4"/>
+                </a:solidFill>
+                <a:effectLst/>
+                <a:latin typeface="Consolas" panose="020B0609020204030204" pitchFamily="49" charset="0"/>
+              </a:rPr>
+              <a:t>, </a:t>
+            </a:r>
+            <a:r>
+              <a:rPr lang="en-US" b="0" dirty="0">
+                <a:solidFill>
+                  <a:srgbClr val="B5CEA8"/>
+                </a:solidFill>
+                <a:effectLst/>
+                <a:latin typeface="Consolas" panose="020B0609020204030204" pitchFamily="49" charset="0"/>
+              </a:rPr>
+              <a:t>10</a:t>
+            </a:r>
+            <a:r>
+              <a:rPr lang="en-US" b="0" dirty="0">
+                <a:solidFill>
+                  <a:srgbClr val="D4D4D4"/>
+                </a:solidFill>
+                <a:effectLst/>
+                <a:latin typeface="Consolas" panose="020B0609020204030204" pitchFamily="49" charset="0"/>
+              </a:rPr>
+              <a:t>};</a:t>
+            </a:r>
+          </a:p>
+          <a:p>
+            <a:r>
+              <a:rPr lang="en-US" b="0" dirty="0">
+                <a:solidFill>
+                  <a:srgbClr val="D4D4D4"/>
+                </a:solidFill>
+                <a:effectLst/>
+                <a:latin typeface="Consolas" panose="020B0609020204030204" pitchFamily="49" charset="0"/>
+              </a:rPr>
+              <a:t>        </a:t>
+            </a:r>
+            <a:r>
+              <a:rPr lang="en-US" b="0" dirty="0" err="1">
+                <a:solidFill>
+                  <a:srgbClr val="4EC9B0"/>
+                </a:solidFill>
+                <a:effectLst/>
+                <a:latin typeface="Consolas" panose="020B0609020204030204" pitchFamily="49" charset="0"/>
+              </a:rPr>
+              <a:t>System</a:t>
+            </a:r>
+            <a:r>
+              <a:rPr lang="en-US" b="0" dirty="0" err="1">
+                <a:solidFill>
+                  <a:srgbClr val="D4D4D4"/>
+                </a:solidFill>
+                <a:effectLst/>
+                <a:latin typeface="Consolas" panose="020B0609020204030204" pitchFamily="49" charset="0"/>
+              </a:rPr>
+              <a:t>.</a:t>
+            </a:r>
+            <a:r>
+              <a:rPr lang="en-US" b="0" dirty="0" err="1">
+                <a:solidFill>
+                  <a:srgbClr val="4FC1FF"/>
+                </a:solidFill>
+                <a:effectLst/>
+                <a:latin typeface="Consolas" panose="020B0609020204030204" pitchFamily="49" charset="0"/>
+              </a:rPr>
+              <a:t>out</a:t>
+            </a:r>
+            <a:r>
+              <a:rPr lang="en-US" b="0" dirty="0" err="1">
+                <a:solidFill>
+                  <a:srgbClr val="D4D4D4"/>
+                </a:solidFill>
+                <a:effectLst/>
+                <a:latin typeface="Consolas" panose="020B0609020204030204" pitchFamily="49" charset="0"/>
+              </a:rPr>
+              <a:t>.</a:t>
+            </a:r>
+            <a:r>
+              <a:rPr lang="en-US" b="0" dirty="0" err="1">
+                <a:solidFill>
+                  <a:srgbClr val="DCDCAA"/>
+                </a:solidFill>
+                <a:effectLst/>
+                <a:latin typeface="Consolas" panose="020B0609020204030204" pitchFamily="49" charset="0"/>
+              </a:rPr>
+              <a:t>println</a:t>
+            </a:r>
+            <a:r>
+              <a:rPr lang="en-US" b="0" dirty="0">
+                <a:solidFill>
+                  <a:srgbClr val="D4D4D4"/>
+                </a:solidFill>
+                <a:effectLst/>
+                <a:latin typeface="Consolas" panose="020B0609020204030204" pitchFamily="49" charset="0"/>
+              </a:rPr>
+              <a:t>(</a:t>
+            </a:r>
+            <a:r>
+              <a:rPr lang="en-US" b="0" dirty="0">
+                <a:solidFill>
+                  <a:srgbClr val="DCDCAA"/>
+                </a:solidFill>
+                <a:effectLst/>
+                <a:latin typeface="Consolas" panose="020B0609020204030204" pitchFamily="49" charset="0"/>
+              </a:rPr>
+              <a:t>sum</a:t>
+            </a:r>
+            <a:r>
+              <a:rPr lang="en-US" b="0" dirty="0">
+                <a:solidFill>
+                  <a:srgbClr val="D4D4D4"/>
+                </a:solidFill>
+                <a:effectLst/>
+                <a:latin typeface="Consolas" panose="020B0609020204030204" pitchFamily="49" charset="0"/>
+              </a:rPr>
+              <a:t>(</a:t>
+            </a:r>
+            <a:r>
+              <a:rPr lang="en-US" b="0" dirty="0">
+                <a:solidFill>
+                  <a:srgbClr val="9CDCFE"/>
+                </a:solidFill>
+                <a:effectLst/>
+                <a:latin typeface="Consolas" panose="020B0609020204030204" pitchFamily="49" charset="0"/>
+              </a:rPr>
+              <a:t>values</a:t>
+            </a:r>
+            <a:r>
+              <a:rPr lang="en-US" b="0" dirty="0">
+                <a:solidFill>
+                  <a:srgbClr val="D4D4D4"/>
+                </a:solidFill>
+                <a:effectLst/>
+                <a:latin typeface="Consolas" panose="020B0609020204030204" pitchFamily="49" charset="0"/>
+              </a:rPr>
+              <a:t>));                              </a:t>
+            </a:r>
+          </a:p>
+          <a:p>
+            <a:r>
+              <a:rPr lang="en-US" b="0" dirty="0">
+                <a:solidFill>
+                  <a:srgbClr val="D4D4D4"/>
+                </a:solidFill>
+                <a:effectLst/>
+                <a:latin typeface="Consolas" panose="020B0609020204030204" pitchFamily="49" charset="0"/>
+              </a:rPr>
+              <a:t>    }</a:t>
+            </a:r>
+          </a:p>
+          <a:p>
+            <a:r>
+              <a:rPr lang="en-US" b="0" dirty="0">
+                <a:solidFill>
+                  <a:srgbClr val="D4D4D4"/>
+                </a:solidFill>
+                <a:effectLst/>
+                <a:latin typeface="Consolas" panose="020B0609020204030204" pitchFamily="49" charset="0"/>
+              </a:rPr>
+              <a:t>} </a:t>
+            </a:r>
+          </a:p>
+        </p:txBody>
+      </p:sp>
+      <p:sp>
+        <p:nvSpPr>
+          <p:cNvPr id="8" name="TextBox 7">
+            <a:extLst>
+              <a:ext uri="{FF2B5EF4-FFF2-40B4-BE49-F238E27FC236}">
+                <a16:creationId xmlns:a16="http://schemas.microsoft.com/office/drawing/2014/main" id="{C0D60C2F-F5DD-43A5-9A93-26861644E962}"/>
+              </a:ext>
+            </a:extLst>
+          </p:cNvPr>
+          <p:cNvSpPr txBox="1"/>
+          <p:nvPr/>
+        </p:nvSpPr>
+        <p:spPr>
+          <a:xfrm>
+            <a:off x="9768114" y="6664674"/>
+            <a:ext cx="4412341" cy="400110"/>
+          </a:xfrm>
+          <a:prstGeom prst="rect">
+            <a:avLst/>
+          </a:prstGeom>
+          <a:noFill/>
+        </p:spPr>
+        <p:txBody>
+          <a:bodyPr wrap="square" rtlCol="0">
+            <a:spAutoFit/>
+          </a:bodyPr>
+          <a:lstStyle/>
+          <a:p>
+            <a:r>
+              <a:rPr lang="en-US" dirty="0">
+                <a:solidFill>
+                  <a:schemeClr val="bg1"/>
+                </a:solidFill>
+              </a:rPr>
+              <a:t>Add values for the answer…</a:t>
+            </a:r>
+          </a:p>
+        </p:txBody>
+      </p:sp>
+    </p:spTree>
+    <p:extLst>
+      <p:ext uri="{BB962C8B-B14F-4D97-AF65-F5344CB8AC3E}">
+        <p14:creationId xmlns:p14="http://schemas.microsoft.com/office/powerpoint/2010/main" val="3830479077"/>
       </p:ext>
     </p:extLst>
   </p:cSld>

</xml_diff>